<commit_message>
replaced volume slicing module by n-dimensional image basics and volume slicing and subsetting module
</commit_message>
<xml_diff>
--- a/figures/resources/volume_slicing.pptx
+++ b/figures/resources/volume_slicing.pptx
@@ -2,18 +2,19 @@
 <file path=ppt/presentation.xml><?xml version="1.0" encoding="utf-8"?>
 <p:presentation xmlns:a="http://schemas.openxmlformats.org/drawingml/2006/main" xmlns:r="http://schemas.openxmlformats.org/officeDocument/2006/relationships" xmlns:p="http://schemas.openxmlformats.org/presentationml/2006/main" saveSubsetFonts="1">
   <p:sldMasterIdLst>
-    <p:sldMasterId id="2147483720" r:id="rId1"/>
+    <p:sldMasterId id="2147483732" r:id="rId1"/>
   </p:sldMasterIdLst>
   <p:sldIdLst>
     <p:sldId id="256" r:id="rId2"/>
+    <p:sldId id="257" r:id="rId3"/>
   </p:sldIdLst>
-  <p:sldSz cx="8229600" cy="11887200"/>
+  <p:sldSz cx="21132800" cy="11887200"/>
   <p:notesSz cx="6858000" cy="9144000"/>
   <p:defaultTextStyle>
     <a:defPPr>
       <a:defRPr lang="en-US"/>
     </a:defPPr>
-    <a:lvl1pPr marL="0" algn="l" defTabSz="914400" rtl="0" eaLnBrk="1" latinLnBrk="0" hangingPunct="1">
+    <a:lvl1pPr marL="0" algn="l" defTabSz="457200" rtl="0" eaLnBrk="1" latinLnBrk="0" hangingPunct="1">
       <a:defRPr sz="1800" kern="1200">
         <a:solidFill>
           <a:schemeClr val="tx1"/>
@@ -23,7 +24,7 @@
         <a:cs typeface="+mn-cs"/>
       </a:defRPr>
     </a:lvl1pPr>
-    <a:lvl2pPr marL="457200" algn="l" defTabSz="914400" rtl="0" eaLnBrk="1" latinLnBrk="0" hangingPunct="1">
+    <a:lvl2pPr marL="457200" algn="l" defTabSz="457200" rtl="0" eaLnBrk="1" latinLnBrk="0" hangingPunct="1">
       <a:defRPr sz="1800" kern="1200">
         <a:solidFill>
           <a:schemeClr val="tx1"/>
@@ -33,7 +34,7 @@
         <a:cs typeface="+mn-cs"/>
       </a:defRPr>
     </a:lvl2pPr>
-    <a:lvl3pPr marL="914400" algn="l" defTabSz="914400" rtl="0" eaLnBrk="1" latinLnBrk="0" hangingPunct="1">
+    <a:lvl3pPr marL="914400" algn="l" defTabSz="457200" rtl="0" eaLnBrk="1" latinLnBrk="0" hangingPunct="1">
       <a:defRPr sz="1800" kern="1200">
         <a:solidFill>
           <a:schemeClr val="tx1"/>
@@ -43,7 +44,7 @@
         <a:cs typeface="+mn-cs"/>
       </a:defRPr>
     </a:lvl3pPr>
-    <a:lvl4pPr marL="1371600" algn="l" defTabSz="914400" rtl="0" eaLnBrk="1" latinLnBrk="0" hangingPunct="1">
+    <a:lvl4pPr marL="1371600" algn="l" defTabSz="457200" rtl="0" eaLnBrk="1" latinLnBrk="0" hangingPunct="1">
       <a:defRPr sz="1800" kern="1200">
         <a:solidFill>
           <a:schemeClr val="tx1"/>
@@ -53,7 +54,7 @@
         <a:cs typeface="+mn-cs"/>
       </a:defRPr>
     </a:lvl4pPr>
-    <a:lvl5pPr marL="1828800" algn="l" defTabSz="914400" rtl="0" eaLnBrk="1" latinLnBrk="0" hangingPunct="1">
+    <a:lvl5pPr marL="1828800" algn="l" defTabSz="457200" rtl="0" eaLnBrk="1" latinLnBrk="0" hangingPunct="1">
       <a:defRPr sz="1800" kern="1200">
         <a:solidFill>
           <a:schemeClr val="tx1"/>
@@ -63,7 +64,7 @@
         <a:cs typeface="+mn-cs"/>
       </a:defRPr>
     </a:lvl5pPr>
-    <a:lvl6pPr marL="2286000" algn="l" defTabSz="914400" rtl="0" eaLnBrk="1" latinLnBrk="0" hangingPunct="1">
+    <a:lvl6pPr marL="2286000" algn="l" defTabSz="457200" rtl="0" eaLnBrk="1" latinLnBrk="0" hangingPunct="1">
       <a:defRPr sz="1800" kern="1200">
         <a:solidFill>
           <a:schemeClr val="tx1"/>
@@ -73,7 +74,7 @@
         <a:cs typeface="+mn-cs"/>
       </a:defRPr>
     </a:lvl6pPr>
-    <a:lvl7pPr marL="2743200" algn="l" defTabSz="914400" rtl="0" eaLnBrk="1" latinLnBrk="0" hangingPunct="1">
+    <a:lvl7pPr marL="2743200" algn="l" defTabSz="457200" rtl="0" eaLnBrk="1" latinLnBrk="0" hangingPunct="1">
       <a:defRPr sz="1800" kern="1200">
         <a:solidFill>
           <a:schemeClr val="tx1"/>
@@ -83,7 +84,7 @@
         <a:cs typeface="+mn-cs"/>
       </a:defRPr>
     </a:lvl7pPr>
-    <a:lvl8pPr marL="3200400" algn="l" defTabSz="914400" rtl="0" eaLnBrk="1" latinLnBrk="0" hangingPunct="1">
+    <a:lvl8pPr marL="3200400" algn="l" defTabSz="457200" rtl="0" eaLnBrk="1" latinLnBrk="0" hangingPunct="1">
       <a:defRPr sz="1800" kern="1200">
         <a:solidFill>
           <a:schemeClr val="tx1"/>
@@ -93,7 +94,7 @@
         <a:cs typeface="+mn-cs"/>
       </a:defRPr>
     </a:lvl8pPr>
-    <a:lvl9pPr marL="3657600" algn="l" defTabSz="914400" rtl="0" eaLnBrk="1" latinLnBrk="0" hangingPunct="1">
+    <a:lvl9pPr marL="3657600" algn="l" defTabSz="457200" rtl="0" eaLnBrk="1" latinLnBrk="0" hangingPunct="1">
       <a:defRPr sz="1800" kern="1200">
         <a:solidFill>
           <a:schemeClr val="tx1"/>
@@ -141,20 +142,20 @@
         </p:nvSpPr>
         <p:spPr>
           <a:xfrm>
-            <a:off x="617220" y="1945429"/>
-            <a:ext cx="6995160" cy="4138507"/>
+            <a:off x="2641600" y="1945429"/>
+            <a:ext cx="15849600" cy="4138507"/>
           </a:xfrm>
         </p:spPr>
         <p:txBody>
           <a:bodyPr anchor="b"/>
           <a:lstStyle>
             <a:lvl1pPr algn="ctr">
-              <a:defRPr sz="5400"/>
+              <a:defRPr sz="10400"/>
             </a:lvl1pPr>
           </a:lstStyle>
           <a:p>
             <a:r>
-              <a:rPr lang="en-US" smtClean="0"/>
+              <a:rPr lang="en-GB"/>
               <a:t>Click to edit Master title style</a:t>
             </a:r>
             <a:endParaRPr lang="en-US" dirty="0"/>
@@ -173,8 +174,8 @@
         </p:nvSpPr>
         <p:spPr>
           <a:xfrm>
-            <a:off x="1028700" y="6243533"/>
-            <a:ext cx="6172200" cy="2869987"/>
+            <a:off x="2641600" y="6243533"/>
+            <a:ext cx="15849600" cy="2869987"/>
           </a:xfrm>
         </p:spPr>
         <p:txBody>
@@ -182,44 +183,44 @@
           <a:lstStyle>
             <a:lvl1pPr marL="0" indent="0" algn="ctr">
               <a:buNone/>
-              <a:defRPr sz="2160"/>
+              <a:defRPr sz="4160"/>
             </a:lvl1pPr>
-            <a:lvl2pPr marL="411480" indent="0" algn="ctr">
+            <a:lvl2pPr marL="792465" indent="0" algn="ctr">
               <a:buNone/>
-              <a:defRPr sz="1800"/>
+              <a:defRPr sz="3467"/>
             </a:lvl2pPr>
-            <a:lvl3pPr marL="822960" indent="0" algn="ctr">
+            <a:lvl3pPr marL="1584930" indent="0" algn="ctr">
               <a:buNone/>
-              <a:defRPr sz="1620"/>
+              <a:defRPr sz="3120"/>
             </a:lvl3pPr>
-            <a:lvl4pPr marL="1234440" indent="0" algn="ctr">
+            <a:lvl4pPr marL="2377394" indent="0" algn="ctr">
               <a:buNone/>
-              <a:defRPr sz="1440"/>
+              <a:defRPr sz="2773"/>
             </a:lvl4pPr>
-            <a:lvl5pPr marL="1645920" indent="0" algn="ctr">
+            <a:lvl5pPr marL="3169859" indent="0" algn="ctr">
               <a:buNone/>
-              <a:defRPr sz="1440"/>
+              <a:defRPr sz="2773"/>
             </a:lvl5pPr>
-            <a:lvl6pPr marL="2057400" indent="0" algn="ctr">
+            <a:lvl6pPr marL="3962324" indent="0" algn="ctr">
               <a:buNone/>
-              <a:defRPr sz="1440"/>
+              <a:defRPr sz="2773"/>
             </a:lvl6pPr>
-            <a:lvl7pPr marL="2468880" indent="0" algn="ctr">
+            <a:lvl7pPr marL="4754789" indent="0" algn="ctr">
               <a:buNone/>
-              <a:defRPr sz="1440"/>
+              <a:defRPr sz="2773"/>
             </a:lvl7pPr>
-            <a:lvl8pPr marL="2880360" indent="0" algn="ctr">
+            <a:lvl8pPr marL="5547253" indent="0" algn="ctr">
               <a:buNone/>
-              <a:defRPr sz="1440"/>
+              <a:defRPr sz="2773"/>
             </a:lvl8pPr>
-            <a:lvl9pPr marL="3291840" indent="0" algn="ctr">
+            <a:lvl9pPr marL="6339718" indent="0" algn="ctr">
               <a:buNone/>
-              <a:defRPr sz="1440"/>
+              <a:defRPr sz="2773"/>
             </a:lvl9pPr>
           </a:lstStyle>
           <a:p>
             <a:r>
-              <a:rPr lang="en-US" smtClean="0"/>
+              <a:rPr lang="en-GB"/>
               <a:t>Click to edit Master subtitle style</a:t>
             </a:r>
             <a:endParaRPr lang="en-US" dirty="0"/>
@@ -243,7 +244,7 @@
           <a:p>
             <a:fld id="{FF874483-BE91-4EEA-A4B1-1FBBEB5201ED}" type="datetimeFigureOut">
               <a:rPr lang="en-US" smtClean="0"/>
-              <a:t>1/22/2022</a:t>
+              <a:t>4/1/23</a:t>
             </a:fld>
             <a:endParaRPr lang="en-US"/>
           </a:p>
@@ -294,7 +295,7 @@
     </p:spTree>
     <p:extLst>
       <p:ext uri="{BB962C8B-B14F-4D97-AF65-F5344CB8AC3E}">
-        <p14:creationId xmlns:p14="http://schemas.microsoft.com/office/powerpoint/2010/main" val="3224214692"/>
+        <p14:creationId xmlns:p14="http://schemas.microsoft.com/office/powerpoint/2010/main" val="3797737479"/>
       </p:ext>
     </p:extLst>
   </p:cSld>
@@ -337,7 +338,7 @@
           <a:lstStyle/>
           <a:p>
             <a:r>
-              <a:rPr lang="en-US" smtClean="0"/>
+              <a:rPr lang="en-GB"/>
               <a:t>Click to edit Master title style</a:t>
             </a:r>
             <a:endParaRPr lang="en-US" dirty="0"/>
@@ -361,35 +362,35 @@
           <a:p>
             <a:pPr lvl="0"/>
             <a:r>
-              <a:rPr lang="en-US" smtClean="0"/>
-              <a:t>Edit Master text styles</a:t>
+              <a:rPr lang="en-GB"/>
+              <a:t>Click to edit Master text styles</a:t>
             </a:r>
           </a:p>
           <a:p>
             <a:pPr lvl="1"/>
             <a:r>
-              <a:rPr lang="en-US" smtClean="0"/>
+              <a:rPr lang="en-GB"/>
               <a:t>Second level</a:t>
             </a:r>
           </a:p>
           <a:p>
             <a:pPr lvl="2"/>
             <a:r>
-              <a:rPr lang="en-US" smtClean="0"/>
+              <a:rPr lang="en-GB"/>
               <a:t>Third level</a:t>
             </a:r>
           </a:p>
           <a:p>
             <a:pPr lvl="3"/>
             <a:r>
-              <a:rPr lang="en-US" smtClean="0"/>
+              <a:rPr lang="en-GB"/>
               <a:t>Fourth level</a:t>
             </a:r>
           </a:p>
           <a:p>
             <a:pPr lvl="4"/>
             <a:r>
-              <a:rPr lang="en-US" smtClean="0"/>
+              <a:rPr lang="en-GB"/>
               <a:t>Fifth level</a:t>
             </a:r>
             <a:endParaRPr lang="en-US" dirty="0"/>
@@ -413,7 +414,7 @@
           <a:p>
             <a:fld id="{FF874483-BE91-4EEA-A4B1-1FBBEB5201ED}" type="datetimeFigureOut">
               <a:rPr lang="en-US" smtClean="0"/>
-              <a:t>1/22/2022</a:t>
+              <a:t>4/1/23</a:t>
             </a:fld>
             <a:endParaRPr lang="en-US"/>
           </a:p>
@@ -464,7 +465,7 @@
     </p:spTree>
     <p:extLst>
       <p:ext uri="{BB962C8B-B14F-4D97-AF65-F5344CB8AC3E}">
-        <p14:creationId xmlns:p14="http://schemas.microsoft.com/office/powerpoint/2010/main" val="35304504"/>
+        <p14:creationId xmlns:p14="http://schemas.microsoft.com/office/powerpoint/2010/main" val="226374242"/>
       </p:ext>
     </p:extLst>
   </p:cSld>
@@ -503,8 +504,8 @@
         </p:nvSpPr>
         <p:spPr>
           <a:xfrm>
-            <a:off x="5889308" y="632883"/>
-            <a:ext cx="1774508" cy="10073853"/>
+            <a:off x="15123160" y="632883"/>
+            <a:ext cx="4556760" cy="10073853"/>
           </a:xfrm>
         </p:spPr>
         <p:txBody>
@@ -512,7 +513,7 @@
           <a:lstStyle/>
           <a:p>
             <a:r>
-              <a:rPr lang="en-US" smtClean="0"/>
+              <a:rPr lang="en-GB"/>
               <a:t>Click to edit Master title style</a:t>
             </a:r>
             <a:endParaRPr lang="en-US" dirty="0"/>
@@ -531,8 +532,8 @@
         </p:nvSpPr>
         <p:spPr>
           <a:xfrm>
-            <a:off x="565785" y="632883"/>
-            <a:ext cx="5220653" cy="10073853"/>
+            <a:off x="1452880" y="632883"/>
+            <a:ext cx="13406120" cy="10073853"/>
           </a:xfrm>
         </p:spPr>
         <p:txBody>
@@ -541,35 +542,35 @@
           <a:p>
             <a:pPr lvl="0"/>
             <a:r>
-              <a:rPr lang="en-US" smtClean="0"/>
-              <a:t>Edit Master text styles</a:t>
+              <a:rPr lang="en-GB"/>
+              <a:t>Click to edit Master text styles</a:t>
             </a:r>
           </a:p>
           <a:p>
             <a:pPr lvl="1"/>
             <a:r>
-              <a:rPr lang="en-US" smtClean="0"/>
+              <a:rPr lang="en-GB"/>
               <a:t>Second level</a:t>
             </a:r>
           </a:p>
           <a:p>
             <a:pPr lvl="2"/>
             <a:r>
-              <a:rPr lang="en-US" smtClean="0"/>
+              <a:rPr lang="en-GB"/>
               <a:t>Third level</a:t>
             </a:r>
           </a:p>
           <a:p>
             <a:pPr lvl="3"/>
             <a:r>
-              <a:rPr lang="en-US" smtClean="0"/>
+              <a:rPr lang="en-GB"/>
               <a:t>Fourth level</a:t>
             </a:r>
           </a:p>
           <a:p>
             <a:pPr lvl="4"/>
             <a:r>
-              <a:rPr lang="en-US" smtClean="0"/>
+              <a:rPr lang="en-GB"/>
               <a:t>Fifth level</a:t>
             </a:r>
             <a:endParaRPr lang="en-US" dirty="0"/>
@@ -593,7 +594,7 @@
           <a:p>
             <a:fld id="{FF874483-BE91-4EEA-A4B1-1FBBEB5201ED}" type="datetimeFigureOut">
               <a:rPr lang="en-US" smtClean="0"/>
-              <a:t>1/22/2022</a:t>
+              <a:t>4/1/23</a:t>
             </a:fld>
             <a:endParaRPr lang="en-US"/>
           </a:p>
@@ -644,7 +645,7 @@
     </p:spTree>
     <p:extLst>
       <p:ext uri="{BB962C8B-B14F-4D97-AF65-F5344CB8AC3E}">
-        <p14:creationId xmlns:p14="http://schemas.microsoft.com/office/powerpoint/2010/main" val="3613662521"/>
+        <p14:creationId xmlns:p14="http://schemas.microsoft.com/office/powerpoint/2010/main" val="3965802082"/>
       </p:ext>
     </p:extLst>
   </p:cSld>
@@ -687,7 +688,7 @@
           <a:lstStyle/>
           <a:p>
             <a:r>
-              <a:rPr lang="en-US" smtClean="0"/>
+              <a:rPr lang="en-GB"/>
               <a:t>Click to edit Master title style</a:t>
             </a:r>
             <a:endParaRPr lang="en-US" dirty="0"/>
@@ -711,35 +712,35 @@
           <a:p>
             <a:pPr lvl="0"/>
             <a:r>
-              <a:rPr lang="en-US" smtClean="0"/>
-              <a:t>Edit Master text styles</a:t>
+              <a:rPr lang="en-GB"/>
+              <a:t>Click to edit Master text styles</a:t>
             </a:r>
           </a:p>
           <a:p>
             <a:pPr lvl="1"/>
             <a:r>
-              <a:rPr lang="en-US" smtClean="0"/>
+              <a:rPr lang="en-GB"/>
               <a:t>Second level</a:t>
             </a:r>
           </a:p>
           <a:p>
             <a:pPr lvl="2"/>
             <a:r>
-              <a:rPr lang="en-US" smtClean="0"/>
+              <a:rPr lang="en-GB"/>
               <a:t>Third level</a:t>
             </a:r>
           </a:p>
           <a:p>
             <a:pPr lvl="3"/>
             <a:r>
-              <a:rPr lang="en-US" smtClean="0"/>
+              <a:rPr lang="en-GB"/>
               <a:t>Fourth level</a:t>
             </a:r>
           </a:p>
           <a:p>
             <a:pPr lvl="4"/>
             <a:r>
-              <a:rPr lang="en-US" smtClean="0"/>
+              <a:rPr lang="en-GB"/>
               <a:t>Fifth level</a:t>
             </a:r>
             <a:endParaRPr lang="en-US" dirty="0"/>
@@ -763,7 +764,7 @@
           <a:p>
             <a:fld id="{FF874483-BE91-4EEA-A4B1-1FBBEB5201ED}" type="datetimeFigureOut">
               <a:rPr lang="en-US" smtClean="0"/>
-              <a:t>1/22/2022</a:t>
+              <a:t>4/1/23</a:t>
             </a:fld>
             <a:endParaRPr lang="en-US"/>
           </a:p>
@@ -814,7 +815,7 @@
     </p:spTree>
     <p:extLst>
       <p:ext uri="{BB962C8B-B14F-4D97-AF65-F5344CB8AC3E}">
-        <p14:creationId xmlns:p14="http://schemas.microsoft.com/office/powerpoint/2010/main" val="94108054"/>
+        <p14:creationId xmlns:p14="http://schemas.microsoft.com/office/powerpoint/2010/main" val="3787370389"/>
       </p:ext>
     </p:extLst>
   </p:cSld>
@@ -853,20 +854,20 @@
         </p:nvSpPr>
         <p:spPr>
           <a:xfrm>
-            <a:off x="561499" y="2963549"/>
-            <a:ext cx="7098030" cy="4944744"/>
+            <a:off x="1441873" y="2963547"/>
+            <a:ext cx="18227040" cy="4944744"/>
           </a:xfrm>
         </p:spPr>
         <p:txBody>
           <a:bodyPr anchor="b"/>
           <a:lstStyle>
             <a:lvl1pPr>
-              <a:defRPr sz="5400"/>
+              <a:defRPr sz="10400"/>
             </a:lvl1pPr>
           </a:lstStyle>
           <a:p>
             <a:r>
-              <a:rPr lang="en-US" smtClean="0"/>
+              <a:rPr lang="en-GB"/>
               <a:t>Click to edit Master title style</a:t>
             </a:r>
             <a:endParaRPr lang="en-US" dirty="0"/>
@@ -885,8 +886,8 @@
         </p:nvSpPr>
         <p:spPr>
           <a:xfrm>
-            <a:off x="561499" y="7955072"/>
-            <a:ext cx="7098030" cy="2600324"/>
+            <a:off x="1441873" y="7955070"/>
+            <a:ext cx="18227040" cy="2600324"/>
           </a:xfrm>
         </p:spPr>
         <p:txBody>
@@ -894,15 +895,17 @@
           <a:lstStyle>
             <a:lvl1pPr marL="0" indent="0">
               <a:buNone/>
-              <a:defRPr sz="2160">
+              <a:defRPr sz="4160">
                 <a:solidFill>
-                  <a:schemeClr val="tx1"/>
+                  <a:schemeClr val="tx1">
+                    <a:tint val="75000"/>
+                  </a:schemeClr>
                 </a:solidFill>
               </a:defRPr>
             </a:lvl1pPr>
-            <a:lvl2pPr marL="411480" indent="0">
+            <a:lvl2pPr marL="792465" indent="0">
               <a:buNone/>
-              <a:defRPr sz="1800">
+              <a:defRPr sz="3467">
                 <a:solidFill>
                   <a:schemeClr val="tx1">
                     <a:tint val="75000"/>
@@ -910,9 +913,9 @@
                 </a:solidFill>
               </a:defRPr>
             </a:lvl2pPr>
-            <a:lvl3pPr marL="822960" indent="0">
+            <a:lvl3pPr marL="1584930" indent="0">
               <a:buNone/>
-              <a:defRPr sz="1620">
+              <a:defRPr sz="3120">
                 <a:solidFill>
                   <a:schemeClr val="tx1">
                     <a:tint val="75000"/>
@@ -920,9 +923,9 @@
                 </a:solidFill>
               </a:defRPr>
             </a:lvl3pPr>
-            <a:lvl4pPr marL="1234440" indent="0">
+            <a:lvl4pPr marL="2377394" indent="0">
               <a:buNone/>
-              <a:defRPr sz="1440">
+              <a:defRPr sz="2773">
                 <a:solidFill>
                   <a:schemeClr val="tx1">
                     <a:tint val="75000"/>
@@ -930,9 +933,9 @@
                 </a:solidFill>
               </a:defRPr>
             </a:lvl4pPr>
-            <a:lvl5pPr marL="1645920" indent="0">
+            <a:lvl5pPr marL="3169859" indent="0">
               <a:buNone/>
-              <a:defRPr sz="1440">
+              <a:defRPr sz="2773">
                 <a:solidFill>
                   <a:schemeClr val="tx1">
                     <a:tint val="75000"/>
@@ -940,9 +943,9 @@
                 </a:solidFill>
               </a:defRPr>
             </a:lvl5pPr>
-            <a:lvl6pPr marL="2057400" indent="0">
+            <a:lvl6pPr marL="3962324" indent="0">
               <a:buNone/>
-              <a:defRPr sz="1440">
+              <a:defRPr sz="2773">
                 <a:solidFill>
                   <a:schemeClr val="tx1">
                     <a:tint val="75000"/>
@@ -950,9 +953,9 @@
                 </a:solidFill>
               </a:defRPr>
             </a:lvl6pPr>
-            <a:lvl7pPr marL="2468880" indent="0">
+            <a:lvl7pPr marL="4754789" indent="0">
               <a:buNone/>
-              <a:defRPr sz="1440">
+              <a:defRPr sz="2773">
                 <a:solidFill>
                   <a:schemeClr val="tx1">
                     <a:tint val="75000"/>
@@ -960,9 +963,9 @@
                 </a:solidFill>
               </a:defRPr>
             </a:lvl7pPr>
-            <a:lvl8pPr marL="2880360" indent="0">
+            <a:lvl8pPr marL="5547253" indent="0">
               <a:buNone/>
-              <a:defRPr sz="1440">
+              <a:defRPr sz="2773">
                 <a:solidFill>
                   <a:schemeClr val="tx1">
                     <a:tint val="75000"/>
@@ -970,9 +973,9 @@
                 </a:solidFill>
               </a:defRPr>
             </a:lvl8pPr>
-            <a:lvl9pPr marL="3291840" indent="0">
+            <a:lvl9pPr marL="6339718" indent="0">
               <a:buNone/>
-              <a:defRPr sz="1440">
+              <a:defRPr sz="2773">
                 <a:solidFill>
                   <a:schemeClr val="tx1">
                     <a:tint val="75000"/>
@@ -984,8 +987,8 @@
           <a:p>
             <a:pPr lvl="0"/>
             <a:r>
-              <a:rPr lang="en-US" smtClean="0"/>
-              <a:t>Edit Master text styles</a:t>
+              <a:rPr lang="en-GB"/>
+              <a:t>Click to edit Master text styles</a:t>
             </a:r>
           </a:p>
         </p:txBody>
@@ -1007,7 +1010,7 @@
           <a:p>
             <a:fld id="{FF874483-BE91-4EEA-A4B1-1FBBEB5201ED}" type="datetimeFigureOut">
               <a:rPr lang="en-US" smtClean="0"/>
-              <a:t>1/22/2022</a:t>
+              <a:t>4/1/23</a:t>
             </a:fld>
             <a:endParaRPr lang="en-US"/>
           </a:p>
@@ -1058,7 +1061,7 @@
     </p:spTree>
     <p:extLst>
       <p:ext uri="{BB962C8B-B14F-4D97-AF65-F5344CB8AC3E}">
-        <p14:creationId xmlns:p14="http://schemas.microsoft.com/office/powerpoint/2010/main" val="2271966021"/>
+        <p14:creationId xmlns:p14="http://schemas.microsoft.com/office/powerpoint/2010/main" val="2548079575"/>
       </p:ext>
     </p:extLst>
   </p:cSld>
@@ -1101,7 +1104,7 @@
           <a:lstStyle/>
           <a:p>
             <a:r>
-              <a:rPr lang="en-US" smtClean="0"/>
+              <a:rPr lang="en-GB"/>
               <a:t>Click to edit Master title style</a:t>
             </a:r>
             <a:endParaRPr lang="en-US" dirty="0"/>
@@ -1120,8 +1123,8 @@
         </p:nvSpPr>
         <p:spPr>
           <a:xfrm>
-            <a:off x="565785" y="3164417"/>
-            <a:ext cx="3497580" cy="7542319"/>
+            <a:off x="1452880" y="3164417"/>
+            <a:ext cx="8981440" cy="7542319"/>
           </a:xfrm>
         </p:spPr>
         <p:txBody>
@@ -1130,35 +1133,35 @@
           <a:p>
             <a:pPr lvl="0"/>
             <a:r>
-              <a:rPr lang="en-US" smtClean="0"/>
-              <a:t>Edit Master text styles</a:t>
+              <a:rPr lang="en-GB"/>
+              <a:t>Click to edit Master text styles</a:t>
             </a:r>
           </a:p>
           <a:p>
             <a:pPr lvl="1"/>
             <a:r>
-              <a:rPr lang="en-US" smtClean="0"/>
+              <a:rPr lang="en-GB"/>
               <a:t>Second level</a:t>
             </a:r>
           </a:p>
           <a:p>
             <a:pPr lvl="2"/>
             <a:r>
-              <a:rPr lang="en-US" smtClean="0"/>
+              <a:rPr lang="en-GB"/>
               <a:t>Third level</a:t>
             </a:r>
           </a:p>
           <a:p>
             <a:pPr lvl="3"/>
             <a:r>
-              <a:rPr lang="en-US" smtClean="0"/>
+              <a:rPr lang="en-GB"/>
               <a:t>Fourth level</a:t>
             </a:r>
           </a:p>
           <a:p>
             <a:pPr lvl="4"/>
             <a:r>
-              <a:rPr lang="en-US" smtClean="0"/>
+              <a:rPr lang="en-GB"/>
               <a:t>Fifth level</a:t>
             </a:r>
             <a:endParaRPr lang="en-US" dirty="0"/>
@@ -1177,8 +1180,8 @@
         </p:nvSpPr>
         <p:spPr>
           <a:xfrm>
-            <a:off x="4166235" y="3164417"/>
-            <a:ext cx="3497580" cy="7542319"/>
+            <a:off x="10698480" y="3164417"/>
+            <a:ext cx="8981440" cy="7542319"/>
           </a:xfrm>
         </p:spPr>
         <p:txBody>
@@ -1187,35 +1190,35 @@
           <a:p>
             <a:pPr lvl="0"/>
             <a:r>
-              <a:rPr lang="en-US" smtClean="0"/>
-              <a:t>Edit Master text styles</a:t>
+              <a:rPr lang="en-GB"/>
+              <a:t>Click to edit Master text styles</a:t>
             </a:r>
           </a:p>
           <a:p>
             <a:pPr lvl="1"/>
             <a:r>
-              <a:rPr lang="en-US" smtClean="0"/>
+              <a:rPr lang="en-GB"/>
               <a:t>Second level</a:t>
             </a:r>
           </a:p>
           <a:p>
             <a:pPr lvl="2"/>
             <a:r>
-              <a:rPr lang="en-US" smtClean="0"/>
+              <a:rPr lang="en-GB"/>
               <a:t>Third level</a:t>
             </a:r>
           </a:p>
           <a:p>
             <a:pPr lvl="3"/>
             <a:r>
-              <a:rPr lang="en-US" smtClean="0"/>
+              <a:rPr lang="en-GB"/>
               <a:t>Fourth level</a:t>
             </a:r>
           </a:p>
           <a:p>
             <a:pPr lvl="4"/>
             <a:r>
-              <a:rPr lang="en-US" smtClean="0"/>
+              <a:rPr lang="en-GB"/>
               <a:t>Fifth level</a:t>
             </a:r>
             <a:endParaRPr lang="en-US" dirty="0"/>
@@ -1239,7 +1242,7 @@
           <a:p>
             <a:fld id="{FF874483-BE91-4EEA-A4B1-1FBBEB5201ED}" type="datetimeFigureOut">
               <a:rPr lang="en-US" smtClean="0"/>
-              <a:t>1/22/2022</a:t>
+              <a:t>4/1/23</a:t>
             </a:fld>
             <a:endParaRPr lang="en-US"/>
           </a:p>
@@ -1290,7 +1293,7 @@
     </p:spTree>
     <p:extLst>
       <p:ext uri="{BB962C8B-B14F-4D97-AF65-F5344CB8AC3E}">
-        <p14:creationId xmlns:p14="http://schemas.microsoft.com/office/powerpoint/2010/main" val="947372943"/>
+        <p14:creationId xmlns:p14="http://schemas.microsoft.com/office/powerpoint/2010/main" val="4245816610"/>
       </p:ext>
     </p:extLst>
   </p:cSld>
@@ -1329,8 +1332,8 @@
         </p:nvSpPr>
         <p:spPr>
           <a:xfrm>
-            <a:off x="566857" y="632886"/>
-            <a:ext cx="7098030" cy="2297643"/>
+            <a:off x="1455633" y="632884"/>
+            <a:ext cx="18227040" cy="2297643"/>
           </a:xfrm>
         </p:spPr>
         <p:txBody>
@@ -1338,7 +1341,7 @@
           <a:lstStyle/>
           <a:p>
             <a:r>
-              <a:rPr lang="en-US" smtClean="0"/>
+              <a:rPr lang="en-GB"/>
               <a:t>Click to edit Master title style</a:t>
             </a:r>
             <a:endParaRPr lang="en-US" dirty="0"/>
@@ -1357,8 +1360,8 @@
         </p:nvSpPr>
         <p:spPr>
           <a:xfrm>
-            <a:off x="566858" y="2914016"/>
-            <a:ext cx="3481506" cy="1428114"/>
+            <a:off x="1455633" y="2914016"/>
+            <a:ext cx="8940164" cy="1428114"/>
           </a:xfrm>
         </p:spPr>
         <p:txBody>
@@ -1366,46 +1369,46 @@
           <a:lstStyle>
             <a:lvl1pPr marL="0" indent="0">
               <a:buNone/>
-              <a:defRPr sz="2160" b="1"/>
+              <a:defRPr sz="4160" b="1"/>
             </a:lvl1pPr>
-            <a:lvl2pPr marL="411480" indent="0">
+            <a:lvl2pPr marL="792465" indent="0">
               <a:buNone/>
-              <a:defRPr sz="1800" b="1"/>
+              <a:defRPr sz="3467" b="1"/>
             </a:lvl2pPr>
-            <a:lvl3pPr marL="822960" indent="0">
+            <a:lvl3pPr marL="1584930" indent="0">
               <a:buNone/>
-              <a:defRPr sz="1620" b="1"/>
+              <a:defRPr sz="3120" b="1"/>
             </a:lvl3pPr>
-            <a:lvl4pPr marL="1234440" indent="0">
+            <a:lvl4pPr marL="2377394" indent="0">
               <a:buNone/>
-              <a:defRPr sz="1440" b="1"/>
+              <a:defRPr sz="2773" b="1"/>
             </a:lvl4pPr>
-            <a:lvl5pPr marL="1645920" indent="0">
+            <a:lvl5pPr marL="3169859" indent="0">
               <a:buNone/>
-              <a:defRPr sz="1440" b="1"/>
+              <a:defRPr sz="2773" b="1"/>
             </a:lvl5pPr>
-            <a:lvl6pPr marL="2057400" indent="0">
+            <a:lvl6pPr marL="3962324" indent="0">
               <a:buNone/>
-              <a:defRPr sz="1440" b="1"/>
+              <a:defRPr sz="2773" b="1"/>
             </a:lvl6pPr>
-            <a:lvl7pPr marL="2468880" indent="0">
+            <a:lvl7pPr marL="4754789" indent="0">
               <a:buNone/>
-              <a:defRPr sz="1440" b="1"/>
+              <a:defRPr sz="2773" b="1"/>
             </a:lvl7pPr>
-            <a:lvl8pPr marL="2880360" indent="0">
+            <a:lvl8pPr marL="5547253" indent="0">
               <a:buNone/>
-              <a:defRPr sz="1440" b="1"/>
+              <a:defRPr sz="2773" b="1"/>
             </a:lvl8pPr>
-            <a:lvl9pPr marL="3291840" indent="0">
+            <a:lvl9pPr marL="6339718" indent="0">
               <a:buNone/>
-              <a:defRPr sz="1440" b="1"/>
+              <a:defRPr sz="2773" b="1"/>
             </a:lvl9pPr>
           </a:lstStyle>
           <a:p>
             <a:pPr lvl="0"/>
             <a:r>
-              <a:rPr lang="en-US" smtClean="0"/>
-              <a:t>Edit Master text styles</a:t>
+              <a:rPr lang="en-GB"/>
+              <a:t>Click to edit Master text styles</a:t>
             </a:r>
           </a:p>
         </p:txBody>
@@ -1422,8 +1425,8 @@
         </p:nvSpPr>
         <p:spPr>
           <a:xfrm>
-            <a:off x="566858" y="4342130"/>
-            <a:ext cx="3481506" cy="6386619"/>
+            <a:off x="1455633" y="4342130"/>
+            <a:ext cx="8940164" cy="6386619"/>
           </a:xfrm>
         </p:spPr>
         <p:txBody>
@@ -1432,35 +1435,35 @@
           <a:p>
             <a:pPr lvl="0"/>
             <a:r>
-              <a:rPr lang="en-US" smtClean="0"/>
-              <a:t>Edit Master text styles</a:t>
+              <a:rPr lang="en-GB"/>
+              <a:t>Click to edit Master text styles</a:t>
             </a:r>
           </a:p>
           <a:p>
             <a:pPr lvl="1"/>
             <a:r>
-              <a:rPr lang="en-US" smtClean="0"/>
+              <a:rPr lang="en-GB"/>
               <a:t>Second level</a:t>
             </a:r>
           </a:p>
           <a:p>
             <a:pPr lvl="2"/>
             <a:r>
-              <a:rPr lang="en-US" smtClean="0"/>
+              <a:rPr lang="en-GB"/>
               <a:t>Third level</a:t>
             </a:r>
           </a:p>
           <a:p>
             <a:pPr lvl="3"/>
             <a:r>
-              <a:rPr lang="en-US" smtClean="0"/>
+              <a:rPr lang="en-GB"/>
               <a:t>Fourth level</a:t>
             </a:r>
           </a:p>
           <a:p>
             <a:pPr lvl="4"/>
             <a:r>
-              <a:rPr lang="en-US" smtClean="0"/>
+              <a:rPr lang="en-GB"/>
               <a:t>Fifth level</a:t>
             </a:r>
             <a:endParaRPr lang="en-US" dirty="0"/>
@@ -1479,8 +1482,8 @@
         </p:nvSpPr>
         <p:spPr>
           <a:xfrm>
-            <a:off x="4166235" y="2914016"/>
-            <a:ext cx="3498652" cy="1428114"/>
+            <a:off x="10698480" y="2914016"/>
+            <a:ext cx="8984193" cy="1428114"/>
           </a:xfrm>
         </p:spPr>
         <p:txBody>
@@ -1488,46 +1491,46 @@
           <a:lstStyle>
             <a:lvl1pPr marL="0" indent="0">
               <a:buNone/>
-              <a:defRPr sz="2160" b="1"/>
+              <a:defRPr sz="4160" b="1"/>
             </a:lvl1pPr>
-            <a:lvl2pPr marL="411480" indent="0">
+            <a:lvl2pPr marL="792465" indent="0">
               <a:buNone/>
-              <a:defRPr sz="1800" b="1"/>
+              <a:defRPr sz="3467" b="1"/>
             </a:lvl2pPr>
-            <a:lvl3pPr marL="822960" indent="0">
+            <a:lvl3pPr marL="1584930" indent="0">
               <a:buNone/>
-              <a:defRPr sz="1620" b="1"/>
+              <a:defRPr sz="3120" b="1"/>
             </a:lvl3pPr>
-            <a:lvl4pPr marL="1234440" indent="0">
+            <a:lvl4pPr marL="2377394" indent="0">
               <a:buNone/>
-              <a:defRPr sz="1440" b="1"/>
+              <a:defRPr sz="2773" b="1"/>
             </a:lvl4pPr>
-            <a:lvl5pPr marL="1645920" indent="0">
+            <a:lvl5pPr marL="3169859" indent="0">
               <a:buNone/>
-              <a:defRPr sz="1440" b="1"/>
+              <a:defRPr sz="2773" b="1"/>
             </a:lvl5pPr>
-            <a:lvl6pPr marL="2057400" indent="0">
+            <a:lvl6pPr marL="3962324" indent="0">
               <a:buNone/>
-              <a:defRPr sz="1440" b="1"/>
+              <a:defRPr sz="2773" b="1"/>
             </a:lvl6pPr>
-            <a:lvl7pPr marL="2468880" indent="0">
+            <a:lvl7pPr marL="4754789" indent="0">
               <a:buNone/>
-              <a:defRPr sz="1440" b="1"/>
+              <a:defRPr sz="2773" b="1"/>
             </a:lvl7pPr>
-            <a:lvl8pPr marL="2880360" indent="0">
+            <a:lvl8pPr marL="5547253" indent="0">
               <a:buNone/>
-              <a:defRPr sz="1440" b="1"/>
+              <a:defRPr sz="2773" b="1"/>
             </a:lvl8pPr>
-            <a:lvl9pPr marL="3291840" indent="0">
+            <a:lvl9pPr marL="6339718" indent="0">
               <a:buNone/>
-              <a:defRPr sz="1440" b="1"/>
+              <a:defRPr sz="2773" b="1"/>
             </a:lvl9pPr>
           </a:lstStyle>
           <a:p>
             <a:pPr lvl="0"/>
             <a:r>
-              <a:rPr lang="en-US" smtClean="0"/>
-              <a:t>Edit Master text styles</a:t>
+              <a:rPr lang="en-GB"/>
+              <a:t>Click to edit Master text styles</a:t>
             </a:r>
           </a:p>
         </p:txBody>
@@ -1544,8 +1547,8 @@
         </p:nvSpPr>
         <p:spPr>
           <a:xfrm>
-            <a:off x="4166235" y="4342130"/>
-            <a:ext cx="3498652" cy="6386619"/>
+            <a:off x="10698480" y="4342130"/>
+            <a:ext cx="8984193" cy="6386619"/>
           </a:xfrm>
         </p:spPr>
         <p:txBody>
@@ -1554,35 +1557,35 @@
           <a:p>
             <a:pPr lvl="0"/>
             <a:r>
-              <a:rPr lang="en-US" smtClean="0"/>
-              <a:t>Edit Master text styles</a:t>
+              <a:rPr lang="en-GB"/>
+              <a:t>Click to edit Master text styles</a:t>
             </a:r>
           </a:p>
           <a:p>
             <a:pPr lvl="1"/>
             <a:r>
-              <a:rPr lang="en-US" smtClean="0"/>
+              <a:rPr lang="en-GB"/>
               <a:t>Second level</a:t>
             </a:r>
           </a:p>
           <a:p>
             <a:pPr lvl="2"/>
             <a:r>
-              <a:rPr lang="en-US" smtClean="0"/>
+              <a:rPr lang="en-GB"/>
               <a:t>Third level</a:t>
             </a:r>
           </a:p>
           <a:p>
             <a:pPr lvl="3"/>
             <a:r>
-              <a:rPr lang="en-US" smtClean="0"/>
+              <a:rPr lang="en-GB"/>
               <a:t>Fourth level</a:t>
             </a:r>
           </a:p>
           <a:p>
             <a:pPr lvl="4"/>
             <a:r>
-              <a:rPr lang="en-US" smtClean="0"/>
+              <a:rPr lang="en-GB"/>
               <a:t>Fifth level</a:t>
             </a:r>
             <a:endParaRPr lang="en-US" dirty="0"/>
@@ -1606,7 +1609,7 @@
           <a:p>
             <a:fld id="{FF874483-BE91-4EEA-A4B1-1FBBEB5201ED}" type="datetimeFigureOut">
               <a:rPr lang="en-US" smtClean="0"/>
-              <a:t>1/22/2022</a:t>
+              <a:t>4/1/23</a:t>
             </a:fld>
             <a:endParaRPr lang="en-US"/>
           </a:p>
@@ -1657,7 +1660,7 @@
     </p:spTree>
     <p:extLst>
       <p:ext uri="{BB962C8B-B14F-4D97-AF65-F5344CB8AC3E}">
-        <p14:creationId xmlns:p14="http://schemas.microsoft.com/office/powerpoint/2010/main" val="2652721081"/>
+        <p14:creationId xmlns:p14="http://schemas.microsoft.com/office/powerpoint/2010/main" val="407868062"/>
       </p:ext>
     </p:extLst>
   </p:cSld>
@@ -1700,7 +1703,7 @@
           <a:lstStyle/>
           <a:p>
             <a:r>
-              <a:rPr lang="en-US" smtClean="0"/>
+              <a:rPr lang="en-GB"/>
               <a:t>Click to edit Master title style</a:t>
             </a:r>
             <a:endParaRPr lang="en-US" dirty="0"/>
@@ -1724,7 +1727,7 @@
           <a:p>
             <a:fld id="{FF874483-BE91-4EEA-A4B1-1FBBEB5201ED}" type="datetimeFigureOut">
               <a:rPr lang="en-US" smtClean="0"/>
-              <a:t>1/22/2022</a:t>
+              <a:t>4/1/23</a:t>
             </a:fld>
             <a:endParaRPr lang="en-US"/>
           </a:p>
@@ -1775,7 +1778,7 @@
     </p:spTree>
     <p:extLst>
       <p:ext uri="{BB962C8B-B14F-4D97-AF65-F5344CB8AC3E}">
-        <p14:creationId xmlns:p14="http://schemas.microsoft.com/office/powerpoint/2010/main" val="98493409"/>
+        <p14:creationId xmlns:p14="http://schemas.microsoft.com/office/powerpoint/2010/main" val="3381817976"/>
       </p:ext>
     </p:extLst>
   </p:cSld>
@@ -1819,7 +1822,7 @@
           <a:p>
             <a:fld id="{FF874483-BE91-4EEA-A4B1-1FBBEB5201ED}" type="datetimeFigureOut">
               <a:rPr lang="en-US" smtClean="0"/>
-              <a:t>1/22/2022</a:t>
+              <a:t>4/1/23</a:t>
             </a:fld>
             <a:endParaRPr lang="en-US"/>
           </a:p>
@@ -1870,7 +1873,7 @@
     </p:spTree>
     <p:extLst>
       <p:ext uri="{BB962C8B-B14F-4D97-AF65-F5344CB8AC3E}">
-        <p14:creationId xmlns:p14="http://schemas.microsoft.com/office/powerpoint/2010/main" val="974234990"/>
+        <p14:creationId xmlns:p14="http://schemas.microsoft.com/office/powerpoint/2010/main" val="2920109219"/>
       </p:ext>
     </p:extLst>
   </p:cSld>
@@ -1909,20 +1912,20 @@
         </p:nvSpPr>
         <p:spPr>
           <a:xfrm>
-            <a:off x="566857" y="792480"/>
-            <a:ext cx="2654260" cy="2773680"/>
+            <a:off x="1455634" y="792480"/>
+            <a:ext cx="6815877" cy="2773680"/>
           </a:xfrm>
         </p:spPr>
         <p:txBody>
           <a:bodyPr anchor="b"/>
           <a:lstStyle>
             <a:lvl1pPr>
-              <a:defRPr sz="2880"/>
+              <a:defRPr sz="5547"/>
             </a:lvl1pPr>
           </a:lstStyle>
           <a:p>
             <a:r>
-              <a:rPr lang="en-US" smtClean="0"/>
+              <a:rPr lang="en-GB"/>
               <a:t>Click to edit Master title style</a:t>
             </a:r>
             <a:endParaRPr lang="en-US" dirty="0"/>
@@ -1941,73 +1944,73 @@
         </p:nvSpPr>
         <p:spPr>
           <a:xfrm>
-            <a:off x="3498652" y="1711539"/>
-            <a:ext cx="4166235" cy="8447617"/>
+            <a:off x="8984193" y="1711537"/>
+            <a:ext cx="10698480" cy="8447617"/>
           </a:xfrm>
         </p:spPr>
         <p:txBody>
           <a:bodyPr/>
           <a:lstStyle>
             <a:lvl1pPr>
-              <a:defRPr sz="2880"/>
+              <a:defRPr sz="5547"/>
             </a:lvl1pPr>
             <a:lvl2pPr>
-              <a:defRPr sz="2520"/>
+              <a:defRPr sz="4853"/>
             </a:lvl2pPr>
             <a:lvl3pPr>
-              <a:defRPr sz="2160"/>
+              <a:defRPr sz="4160"/>
             </a:lvl3pPr>
             <a:lvl4pPr>
-              <a:defRPr sz="1800"/>
+              <a:defRPr sz="3467"/>
             </a:lvl4pPr>
             <a:lvl5pPr>
-              <a:defRPr sz="1800"/>
+              <a:defRPr sz="3467"/>
             </a:lvl5pPr>
             <a:lvl6pPr>
-              <a:defRPr sz="1800"/>
+              <a:defRPr sz="3467"/>
             </a:lvl6pPr>
             <a:lvl7pPr>
-              <a:defRPr sz="1800"/>
+              <a:defRPr sz="3467"/>
             </a:lvl7pPr>
             <a:lvl8pPr>
-              <a:defRPr sz="1800"/>
+              <a:defRPr sz="3467"/>
             </a:lvl8pPr>
             <a:lvl9pPr>
-              <a:defRPr sz="1800"/>
+              <a:defRPr sz="3467"/>
             </a:lvl9pPr>
           </a:lstStyle>
           <a:p>
             <a:pPr lvl="0"/>
             <a:r>
-              <a:rPr lang="en-US" smtClean="0"/>
-              <a:t>Edit Master text styles</a:t>
+              <a:rPr lang="en-GB"/>
+              <a:t>Click to edit Master text styles</a:t>
             </a:r>
           </a:p>
           <a:p>
             <a:pPr lvl="1"/>
             <a:r>
-              <a:rPr lang="en-US" smtClean="0"/>
+              <a:rPr lang="en-GB"/>
               <a:t>Second level</a:t>
             </a:r>
           </a:p>
           <a:p>
             <a:pPr lvl="2"/>
             <a:r>
-              <a:rPr lang="en-US" smtClean="0"/>
+              <a:rPr lang="en-GB"/>
               <a:t>Third level</a:t>
             </a:r>
           </a:p>
           <a:p>
             <a:pPr lvl="3"/>
             <a:r>
-              <a:rPr lang="en-US" smtClean="0"/>
+              <a:rPr lang="en-GB"/>
               <a:t>Fourth level</a:t>
             </a:r>
           </a:p>
           <a:p>
             <a:pPr lvl="4"/>
             <a:r>
-              <a:rPr lang="en-US" smtClean="0"/>
+              <a:rPr lang="en-GB"/>
               <a:t>Fifth level</a:t>
             </a:r>
             <a:endParaRPr lang="en-US" dirty="0"/>
@@ -2026,8 +2029,8 @@
         </p:nvSpPr>
         <p:spPr>
           <a:xfrm>
-            <a:off x="566857" y="3566160"/>
-            <a:ext cx="2654260" cy="6606753"/>
+            <a:off x="1455634" y="3566160"/>
+            <a:ext cx="6815877" cy="6606753"/>
           </a:xfrm>
         </p:spPr>
         <p:txBody>
@@ -2035,46 +2038,46 @@
           <a:lstStyle>
             <a:lvl1pPr marL="0" indent="0">
               <a:buNone/>
-              <a:defRPr sz="1440"/>
+              <a:defRPr sz="2773"/>
             </a:lvl1pPr>
-            <a:lvl2pPr marL="411480" indent="0">
+            <a:lvl2pPr marL="792465" indent="0">
               <a:buNone/>
-              <a:defRPr sz="1260"/>
+              <a:defRPr sz="2427"/>
             </a:lvl2pPr>
-            <a:lvl3pPr marL="822960" indent="0">
+            <a:lvl3pPr marL="1584930" indent="0">
               <a:buNone/>
-              <a:defRPr sz="1080"/>
+              <a:defRPr sz="2080"/>
             </a:lvl3pPr>
-            <a:lvl4pPr marL="1234440" indent="0">
+            <a:lvl4pPr marL="2377394" indent="0">
               <a:buNone/>
-              <a:defRPr sz="900"/>
+              <a:defRPr sz="1733"/>
             </a:lvl4pPr>
-            <a:lvl5pPr marL="1645920" indent="0">
+            <a:lvl5pPr marL="3169859" indent="0">
               <a:buNone/>
-              <a:defRPr sz="900"/>
+              <a:defRPr sz="1733"/>
             </a:lvl5pPr>
-            <a:lvl6pPr marL="2057400" indent="0">
+            <a:lvl6pPr marL="3962324" indent="0">
               <a:buNone/>
-              <a:defRPr sz="900"/>
+              <a:defRPr sz="1733"/>
             </a:lvl6pPr>
-            <a:lvl7pPr marL="2468880" indent="0">
+            <a:lvl7pPr marL="4754789" indent="0">
               <a:buNone/>
-              <a:defRPr sz="900"/>
+              <a:defRPr sz="1733"/>
             </a:lvl7pPr>
-            <a:lvl8pPr marL="2880360" indent="0">
+            <a:lvl8pPr marL="5547253" indent="0">
               <a:buNone/>
-              <a:defRPr sz="900"/>
+              <a:defRPr sz="1733"/>
             </a:lvl8pPr>
-            <a:lvl9pPr marL="3291840" indent="0">
+            <a:lvl9pPr marL="6339718" indent="0">
               <a:buNone/>
-              <a:defRPr sz="900"/>
+              <a:defRPr sz="1733"/>
             </a:lvl9pPr>
           </a:lstStyle>
           <a:p>
             <a:pPr lvl="0"/>
             <a:r>
-              <a:rPr lang="en-US" smtClean="0"/>
-              <a:t>Edit Master text styles</a:t>
+              <a:rPr lang="en-GB"/>
+              <a:t>Click to edit Master text styles</a:t>
             </a:r>
           </a:p>
         </p:txBody>
@@ -2096,7 +2099,7 @@
           <a:p>
             <a:fld id="{FF874483-BE91-4EEA-A4B1-1FBBEB5201ED}" type="datetimeFigureOut">
               <a:rPr lang="en-US" smtClean="0"/>
-              <a:t>1/22/2022</a:t>
+              <a:t>4/1/23</a:t>
             </a:fld>
             <a:endParaRPr lang="en-US"/>
           </a:p>
@@ -2147,7 +2150,7 @@
     </p:spTree>
     <p:extLst>
       <p:ext uri="{BB962C8B-B14F-4D97-AF65-F5344CB8AC3E}">
-        <p14:creationId xmlns:p14="http://schemas.microsoft.com/office/powerpoint/2010/main" val="3241456680"/>
+        <p14:creationId xmlns:p14="http://schemas.microsoft.com/office/powerpoint/2010/main" val="2609505581"/>
       </p:ext>
     </p:extLst>
   </p:cSld>
@@ -2186,20 +2189,20 @@
         </p:nvSpPr>
         <p:spPr>
           <a:xfrm>
-            <a:off x="566857" y="792480"/>
-            <a:ext cx="2654260" cy="2773680"/>
+            <a:off x="1455634" y="792480"/>
+            <a:ext cx="6815877" cy="2773680"/>
           </a:xfrm>
         </p:spPr>
         <p:txBody>
           <a:bodyPr anchor="b"/>
           <a:lstStyle>
             <a:lvl1pPr>
-              <a:defRPr sz="2880"/>
+              <a:defRPr sz="5547"/>
             </a:lvl1pPr>
           </a:lstStyle>
           <a:p>
             <a:r>
-              <a:rPr lang="en-US" smtClean="0"/>
+              <a:rPr lang="en-GB"/>
               <a:t>Click to edit Master title style</a:t>
             </a:r>
             <a:endParaRPr lang="en-US" dirty="0"/>
@@ -2218,8 +2221,8 @@
         </p:nvSpPr>
         <p:spPr>
           <a:xfrm>
-            <a:off x="3498652" y="1711539"/>
-            <a:ext cx="4166235" cy="8447617"/>
+            <a:off x="8984193" y="1711537"/>
+            <a:ext cx="10698480" cy="8447617"/>
           </a:xfrm>
         </p:spPr>
         <p:txBody>
@@ -2227,44 +2230,44 @@
           <a:lstStyle>
             <a:lvl1pPr marL="0" indent="0">
               <a:buNone/>
-              <a:defRPr sz="2880"/>
+              <a:defRPr sz="5547"/>
             </a:lvl1pPr>
-            <a:lvl2pPr marL="411480" indent="0">
+            <a:lvl2pPr marL="792465" indent="0">
               <a:buNone/>
-              <a:defRPr sz="2520"/>
+              <a:defRPr sz="4853"/>
             </a:lvl2pPr>
-            <a:lvl3pPr marL="822960" indent="0">
+            <a:lvl3pPr marL="1584930" indent="0">
               <a:buNone/>
-              <a:defRPr sz="2160"/>
+              <a:defRPr sz="4160"/>
             </a:lvl3pPr>
-            <a:lvl4pPr marL="1234440" indent="0">
+            <a:lvl4pPr marL="2377394" indent="0">
               <a:buNone/>
-              <a:defRPr sz="1800"/>
+              <a:defRPr sz="3467"/>
             </a:lvl4pPr>
-            <a:lvl5pPr marL="1645920" indent="0">
+            <a:lvl5pPr marL="3169859" indent="0">
               <a:buNone/>
-              <a:defRPr sz="1800"/>
+              <a:defRPr sz="3467"/>
             </a:lvl5pPr>
-            <a:lvl6pPr marL="2057400" indent="0">
+            <a:lvl6pPr marL="3962324" indent="0">
               <a:buNone/>
-              <a:defRPr sz="1800"/>
+              <a:defRPr sz="3467"/>
             </a:lvl6pPr>
-            <a:lvl7pPr marL="2468880" indent="0">
+            <a:lvl7pPr marL="4754789" indent="0">
               <a:buNone/>
-              <a:defRPr sz="1800"/>
+              <a:defRPr sz="3467"/>
             </a:lvl7pPr>
-            <a:lvl8pPr marL="2880360" indent="0">
+            <a:lvl8pPr marL="5547253" indent="0">
               <a:buNone/>
-              <a:defRPr sz="1800"/>
+              <a:defRPr sz="3467"/>
             </a:lvl8pPr>
-            <a:lvl9pPr marL="3291840" indent="0">
+            <a:lvl9pPr marL="6339718" indent="0">
               <a:buNone/>
-              <a:defRPr sz="1800"/>
+              <a:defRPr sz="3467"/>
             </a:lvl9pPr>
           </a:lstStyle>
           <a:p>
             <a:r>
-              <a:rPr lang="en-US" smtClean="0"/>
+              <a:rPr lang="en-GB"/>
               <a:t>Click icon to add picture</a:t>
             </a:r>
             <a:endParaRPr lang="en-US" dirty="0"/>
@@ -2283,8 +2286,8 @@
         </p:nvSpPr>
         <p:spPr>
           <a:xfrm>
-            <a:off x="566857" y="3566160"/>
-            <a:ext cx="2654260" cy="6606753"/>
+            <a:off x="1455634" y="3566160"/>
+            <a:ext cx="6815877" cy="6606753"/>
           </a:xfrm>
         </p:spPr>
         <p:txBody>
@@ -2292,46 +2295,46 @@
           <a:lstStyle>
             <a:lvl1pPr marL="0" indent="0">
               <a:buNone/>
-              <a:defRPr sz="1440"/>
+              <a:defRPr sz="2773"/>
             </a:lvl1pPr>
-            <a:lvl2pPr marL="411480" indent="0">
+            <a:lvl2pPr marL="792465" indent="0">
               <a:buNone/>
-              <a:defRPr sz="1260"/>
+              <a:defRPr sz="2427"/>
             </a:lvl2pPr>
-            <a:lvl3pPr marL="822960" indent="0">
+            <a:lvl3pPr marL="1584930" indent="0">
               <a:buNone/>
-              <a:defRPr sz="1080"/>
+              <a:defRPr sz="2080"/>
             </a:lvl3pPr>
-            <a:lvl4pPr marL="1234440" indent="0">
+            <a:lvl4pPr marL="2377394" indent="0">
               <a:buNone/>
-              <a:defRPr sz="900"/>
+              <a:defRPr sz="1733"/>
             </a:lvl4pPr>
-            <a:lvl5pPr marL="1645920" indent="0">
+            <a:lvl5pPr marL="3169859" indent="0">
               <a:buNone/>
-              <a:defRPr sz="900"/>
+              <a:defRPr sz="1733"/>
             </a:lvl5pPr>
-            <a:lvl6pPr marL="2057400" indent="0">
+            <a:lvl6pPr marL="3962324" indent="0">
               <a:buNone/>
-              <a:defRPr sz="900"/>
+              <a:defRPr sz="1733"/>
             </a:lvl6pPr>
-            <a:lvl7pPr marL="2468880" indent="0">
+            <a:lvl7pPr marL="4754789" indent="0">
               <a:buNone/>
-              <a:defRPr sz="900"/>
+              <a:defRPr sz="1733"/>
             </a:lvl7pPr>
-            <a:lvl8pPr marL="2880360" indent="0">
+            <a:lvl8pPr marL="5547253" indent="0">
               <a:buNone/>
-              <a:defRPr sz="900"/>
+              <a:defRPr sz="1733"/>
             </a:lvl8pPr>
-            <a:lvl9pPr marL="3291840" indent="0">
+            <a:lvl9pPr marL="6339718" indent="0">
               <a:buNone/>
-              <a:defRPr sz="900"/>
+              <a:defRPr sz="1733"/>
             </a:lvl9pPr>
           </a:lstStyle>
           <a:p>
             <a:pPr lvl="0"/>
             <a:r>
-              <a:rPr lang="en-US" smtClean="0"/>
-              <a:t>Edit Master text styles</a:t>
+              <a:rPr lang="en-GB"/>
+              <a:t>Click to edit Master text styles</a:t>
             </a:r>
           </a:p>
         </p:txBody>
@@ -2353,7 +2356,7 @@
           <a:p>
             <a:fld id="{FF874483-BE91-4EEA-A4B1-1FBBEB5201ED}" type="datetimeFigureOut">
               <a:rPr lang="en-US" smtClean="0"/>
-              <a:t>1/22/2022</a:t>
+              <a:t>4/1/23</a:t>
             </a:fld>
             <a:endParaRPr lang="en-US"/>
           </a:p>
@@ -2404,7 +2407,7 @@
     </p:spTree>
     <p:extLst>
       <p:ext uri="{BB962C8B-B14F-4D97-AF65-F5344CB8AC3E}">
-        <p14:creationId xmlns:p14="http://schemas.microsoft.com/office/powerpoint/2010/main" val="4266362938"/>
+        <p14:creationId xmlns:p14="http://schemas.microsoft.com/office/powerpoint/2010/main" val="315838784"/>
       </p:ext>
     </p:extLst>
   </p:cSld>
@@ -2448,8 +2451,8 @@
         </p:nvSpPr>
         <p:spPr>
           <a:xfrm>
-            <a:off x="565785" y="632886"/>
-            <a:ext cx="7098030" cy="2297643"/>
+            <a:off x="1452880" y="632884"/>
+            <a:ext cx="18227040" cy="2297643"/>
           </a:xfrm>
           <a:prstGeom prst="rect">
             <a:avLst/>
@@ -2462,7 +2465,7 @@
           <a:lstStyle/>
           <a:p>
             <a:r>
-              <a:rPr lang="en-US" smtClean="0"/>
+              <a:rPr lang="en-GB"/>
               <a:t>Click to edit Master title style</a:t>
             </a:r>
             <a:endParaRPr lang="en-US" dirty="0"/>
@@ -2481,8 +2484,8 @@
         </p:nvSpPr>
         <p:spPr>
           <a:xfrm>
-            <a:off x="565785" y="3164417"/>
-            <a:ext cx="7098030" cy="7542319"/>
+            <a:off x="1452880" y="3164417"/>
+            <a:ext cx="18227040" cy="7542319"/>
           </a:xfrm>
           <a:prstGeom prst="rect">
             <a:avLst/>
@@ -2496,35 +2499,35 @@
           <a:p>
             <a:pPr lvl="0"/>
             <a:r>
-              <a:rPr lang="en-US" smtClean="0"/>
-              <a:t>Edit Master text styles</a:t>
+              <a:rPr lang="en-GB"/>
+              <a:t>Click to edit Master text styles</a:t>
             </a:r>
           </a:p>
           <a:p>
             <a:pPr lvl="1"/>
             <a:r>
-              <a:rPr lang="en-US" smtClean="0"/>
+              <a:rPr lang="en-GB"/>
               <a:t>Second level</a:t>
             </a:r>
           </a:p>
           <a:p>
             <a:pPr lvl="2"/>
             <a:r>
-              <a:rPr lang="en-US" smtClean="0"/>
+              <a:rPr lang="en-GB"/>
               <a:t>Third level</a:t>
             </a:r>
           </a:p>
           <a:p>
             <a:pPr lvl="3"/>
             <a:r>
-              <a:rPr lang="en-US" smtClean="0"/>
+              <a:rPr lang="en-GB"/>
               <a:t>Fourth level</a:t>
             </a:r>
           </a:p>
           <a:p>
             <a:pPr lvl="4"/>
             <a:r>
-              <a:rPr lang="en-US" smtClean="0"/>
+              <a:rPr lang="en-GB"/>
               <a:t>Fifth level</a:t>
             </a:r>
             <a:endParaRPr lang="en-US" dirty="0"/>
@@ -2543,8 +2546,8 @@
         </p:nvSpPr>
         <p:spPr>
           <a:xfrm>
-            <a:off x="565785" y="11017676"/>
-            <a:ext cx="1851660" cy="632883"/>
+            <a:off x="1452880" y="11017674"/>
+            <a:ext cx="4754880" cy="632883"/>
           </a:xfrm>
           <a:prstGeom prst="rect">
             <a:avLst/>
@@ -2554,7 +2557,7 @@
           <a:bodyPr vert="horz" lIns="91440" tIns="45720" rIns="91440" bIns="45720" rtlCol="0" anchor="ctr"/>
           <a:lstStyle>
             <a:lvl1pPr algn="l">
-              <a:defRPr sz="1080">
+              <a:defRPr sz="2080">
                 <a:solidFill>
                   <a:schemeClr val="tx1">
                     <a:tint val="75000"/>
@@ -2566,7 +2569,7 @@
           <a:p>
             <a:fld id="{FF874483-BE91-4EEA-A4B1-1FBBEB5201ED}" type="datetimeFigureOut">
               <a:rPr lang="en-US" smtClean="0"/>
-              <a:t>1/22/2022</a:t>
+              <a:t>4/1/23</a:t>
             </a:fld>
             <a:endParaRPr lang="en-US"/>
           </a:p>
@@ -2584,8 +2587,8 @@
         </p:nvSpPr>
         <p:spPr>
           <a:xfrm>
-            <a:off x="2726055" y="11017676"/>
-            <a:ext cx="2777490" cy="632883"/>
+            <a:off x="7000240" y="11017674"/>
+            <a:ext cx="7132320" cy="632883"/>
           </a:xfrm>
           <a:prstGeom prst="rect">
             <a:avLst/>
@@ -2595,7 +2598,7 @@
           <a:bodyPr vert="horz" lIns="91440" tIns="45720" rIns="91440" bIns="45720" rtlCol="0" anchor="ctr"/>
           <a:lstStyle>
             <a:lvl1pPr algn="ctr">
-              <a:defRPr sz="1080">
+              <a:defRPr sz="2080">
                 <a:solidFill>
                   <a:schemeClr val="tx1">
                     <a:tint val="75000"/>
@@ -2621,8 +2624,8 @@
         </p:nvSpPr>
         <p:spPr>
           <a:xfrm>
-            <a:off x="5812155" y="11017676"/>
-            <a:ext cx="1851660" cy="632883"/>
+            <a:off x="14925040" y="11017674"/>
+            <a:ext cx="4754880" cy="632883"/>
           </a:xfrm>
           <a:prstGeom prst="rect">
             <a:avLst/>
@@ -2632,7 +2635,7 @@
           <a:bodyPr vert="horz" lIns="91440" tIns="45720" rIns="91440" bIns="45720" rtlCol="0" anchor="ctr"/>
           <a:lstStyle>
             <a:lvl1pPr algn="r">
-              <a:defRPr sz="1080">
+              <a:defRPr sz="2080">
                 <a:solidFill>
                   <a:schemeClr val="tx1">
                     <a:tint val="75000"/>
@@ -2653,27 +2656,27 @@
     </p:spTree>
     <p:extLst>
       <p:ext uri="{BB962C8B-B14F-4D97-AF65-F5344CB8AC3E}">
-        <p14:creationId xmlns:p14="http://schemas.microsoft.com/office/powerpoint/2010/main" val="2405835649"/>
+        <p14:creationId xmlns:p14="http://schemas.microsoft.com/office/powerpoint/2010/main" val="2413993074"/>
       </p:ext>
     </p:extLst>
   </p:cSld>
   <p:clrMap bg1="lt1" tx1="dk1" bg2="lt2" tx2="dk2" accent1="accent1" accent2="accent2" accent3="accent3" accent4="accent4" accent5="accent5" accent6="accent6" hlink="hlink" folHlink="folHlink"/>
   <p:sldLayoutIdLst>
-    <p:sldLayoutId id="2147483721" r:id="rId1"/>
-    <p:sldLayoutId id="2147483722" r:id="rId2"/>
-    <p:sldLayoutId id="2147483723" r:id="rId3"/>
-    <p:sldLayoutId id="2147483724" r:id="rId4"/>
-    <p:sldLayoutId id="2147483725" r:id="rId5"/>
-    <p:sldLayoutId id="2147483726" r:id="rId6"/>
-    <p:sldLayoutId id="2147483727" r:id="rId7"/>
-    <p:sldLayoutId id="2147483728" r:id="rId8"/>
-    <p:sldLayoutId id="2147483729" r:id="rId9"/>
-    <p:sldLayoutId id="2147483730" r:id="rId10"/>
-    <p:sldLayoutId id="2147483731" r:id="rId11"/>
+    <p:sldLayoutId id="2147483733" r:id="rId1"/>
+    <p:sldLayoutId id="2147483734" r:id="rId2"/>
+    <p:sldLayoutId id="2147483735" r:id="rId3"/>
+    <p:sldLayoutId id="2147483736" r:id="rId4"/>
+    <p:sldLayoutId id="2147483737" r:id="rId5"/>
+    <p:sldLayoutId id="2147483738" r:id="rId6"/>
+    <p:sldLayoutId id="2147483739" r:id="rId7"/>
+    <p:sldLayoutId id="2147483740" r:id="rId8"/>
+    <p:sldLayoutId id="2147483741" r:id="rId9"/>
+    <p:sldLayoutId id="2147483742" r:id="rId10"/>
+    <p:sldLayoutId id="2147483743" r:id="rId11"/>
   </p:sldLayoutIdLst>
   <p:txStyles>
     <p:titleStyle>
-      <a:lvl1pPr algn="l" defTabSz="822960" rtl="0" eaLnBrk="1" latinLnBrk="0" hangingPunct="1">
+      <a:lvl1pPr algn="l" defTabSz="1584930" rtl="0" eaLnBrk="1" latinLnBrk="0" hangingPunct="1">
         <a:lnSpc>
           <a:spcPct val="90000"/>
         </a:lnSpc>
@@ -2681,7 +2684,7 @@
           <a:spcPct val="0"/>
         </a:spcBef>
         <a:buNone/>
-        <a:defRPr sz="3960" kern="1200">
+        <a:defRPr sz="7627" kern="1200">
           <a:solidFill>
             <a:schemeClr val="tx1"/>
           </a:solidFill>
@@ -2692,16 +2695,16 @@
       </a:lvl1pPr>
     </p:titleStyle>
     <p:bodyStyle>
-      <a:lvl1pPr marL="205740" indent="-205740" algn="l" defTabSz="822960" rtl="0" eaLnBrk="1" latinLnBrk="0" hangingPunct="1">
+      <a:lvl1pPr marL="396232" indent="-396232" algn="l" defTabSz="1584930" rtl="0" eaLnBrk="1" latinLnBrk="0" hangingPunct="1">
         <a:lnSpc>
           <a:spcPct val="90000"/>
         </a:lnSpc>
         <a:spcBef>
-          <a:spcPts val="900"/>
+          <a:spcPts val="1733"/>
         </a:spcBef>
         <a:buFont typeface="Arial" panose="020B0604020202020204" pitchFamily="34" charset="0"/>
         <a:buChar char="•"/>
-        <a:defRPr sz="2520" kern="1200">
+        <a:defRPr sz="4853" kern="1200">
           <a:solidFill>
             <a:schemeClr val="tx1"/>
           </a:solidFill>
@@ -2710,16 +2713,16 @@
           <a:cs typeface="+mn-cs"/>
         </a:defRPr>
       </a:lvl1pPr>
-      <a:lvl2pPr marL="617220" indent="-205740" algn="l" defTabSz="822960" rtl="0" eaLnBrk="1" latinLnBrk="0" hangingPunct="1">
+      <a:lvl2pPr marL="1188697" indent="-396232" algn="l" defTabSz="1584930" rtl="0" eaLnBrk="1" latinLnBrk="0" hangingPunct="1">
         <a:lnSpc>
           <a:spcPct val="90000"/>
         </a:lnSpc>
         <a:spcBef>
-          <a:spcPts val="450"/>
+          <a:spcPts val="867"/>
         </a:spcBef>
         <a:buFont typeface="Arial" panose="020B0604020202020204" pitchFamily="34" charset="0"/>
         <a:buChar char="•"/>
-        <a:defRPr sz="2160" kern="1200">
+        <a:defRPr sz="4160" kern="1200">
           <a:solidFill>
             <a:schemeClr val="tx1"/>
           </a:solidFill>
@@ -2728,16 +2731,16 @@
           <a:cs typeface="+mn-cs"/>
         </a:defRPr>
       </a:lvl2pPr>
-      <a:lvl3pPr marL="1028700" indent="-205740" algn="l" defTabSz="822960" rtl="0" eaLnBrk="1" latinLnBrk="0" hangingPunct="1">
+      <a:lvl3pPr marL="1981162" indent="-396232" algn="l" defTabSz="1584930" rtl="0" eaLnBrk="1" latinLnBrk="0" hangingPunct="1">
         <a:lnSpc>
           <a:spcPct val="90000"/>
         </a:lnSpc>
         <a:spcBef>
-          <a:spcPts val="450"/>
+          <a:spcPts val="867"/>
         </a:spcBef>
         <a:buFont typeface="Arial" panose="020B0604020202020204" pitchFamily="34" charset="0"/>
         <a:buChar char="•"/>
-        <a:defRPr sz="1800" kern="1200">
+        <a:defRPr sz="3467" kern="1200">
           <a:solidFill>
             <a:schemeClr val="tx1"/>
           </a:solidFill>
@@ -2746,16 +2749,16 @@
           <a:cs typeface="+mn-cs"/>
         </a:defRPr>
       </a:lvl3pPr>
-      <a:lvl4pPr marL="1440180" indent="-205740" algn="l" defTabSz="822960" rtl="0" eaLnBrk="1" latinLnBrk="0" hangingPunct="1">
+      <a:lvl4pPr marL="2773627" indent="-396232" algn="l" defTabSz="1584930" rtl="0" eaLnBrk="1" latinLnBrk="0" hangingPunct="1">
         <a:lnSpc>
           <a:spcPct val="90000"/>
         </a:lnSpc>
         <a:spcBef>
-          <a:spcPts val="450"/>
+          <a:spcPts val="867"/>
         </a:spcBef>
         <a:buFont typeface="Arial" panose="020B0604020202020204" pitchFamily="34" charset="0"/>
         <a:buChar char="•"/>
-        <a:defRPr sz="1620" kern="1200">
+        <a:defRPr sz="3120" kern="1200">
           <a:solidFill>
             <a:schemeClr val="tx1"/>
           </a:solidFill>
@@ -2764,16 +2767,16 @@
           <a:cs typeface="+mn-cs"/>
         </a:defRPr>
       </a:lvl4pPr>
-      <a:lvl5pPr marL="1851660" indent="-205740" algn="l" defTabSz="822960" rtl="0" eaLnBrk="1" latinLnBrk="0" hangingPunct="1">
+      <a:lvl5pPr marL="3566091" indent="-396232" algn="l" defTabSz="1584930" rtl="0" eaLnBrk="1" latinLnBrk="0" hangingPunct="1">
         <a:lnSpc>
           <a:spcPct val="90000"/>
         </a:lnSpc>
         <a:spcBef>
-          <a:spcPts val="450"/>
+          <a:spcPts val="867"/>
         </a:spcBef>
         <a:buFont typeface="Arial" panose="020B0604020202020204" pitchFamily="34" charset="0"/>
         <a:buChar char="•"/>
-        <a:defRPr sz="1620" kern="1200">
+        <a:defRPr sz="3120" kern="1200">
           <a:solidFill>
             <a:schemeClr val="tx1"/>
           </a:solidFill>
@@ -2782,16 +2785,16 @@
           <a:cs typeface="+mn-cs"/>
         </a:defRPr>
       </a:lvl5pPr>
-      <a:lvl6pPr marL="2263140" indent="-205740" algn="l" defTabSz="822960" rtl="0" eaLnBrk="1" latinLnBrk="0" hangingPunct="1">
+      <a:lvl6pPr marL="4358556" indent="-396232" algn="l" defTabSz="1584930" rtl="0" eaLnBrk="1" latinLnBrk="0" hangingPunct="1">
         <a:lnSpc>
           <a:spcPct val="90000"/>
         </a:lnSpc>
         <a:spcBef>
-          <a:spcPts val="450"/>
+          <a:spcPts val="867"/>
         </a:spcBef>
         <a:buFont typeface="Arial" panose="020B0604020202020204" pitchFamily="34" charset="0"/>
         <a:buChar char="•"/>
-        <a:defRPr sz="1620" kern="1200">
+        <a:defRPr sz="3120" kern="1200">
           <a:solidFill>
             <a:schemeClr val="tx1"/>
           </a:solidFill>
@@ -2800,16 +2803,16 @@
           <a:cs typeface="+mn-cs"/>
         </a:defRPr>
       </a:lvl6pPr>
-      <a:lvl7pPr marL="2674620" indent="-205740" algn="l" defTabSz="822960" rtl="0" eaLnBrk="1" latinLnBrk="0" hangingPunct="1">
+      <a:lvl7pPr marL="5151021" indent="-396232" algn="l" defTabSz="1584930" rtl="0" eaLnBrk="1" latinLnBrk="0" hangingPunct="1">
         <a:lnSpc>
           <a:spcPct val="90000"/>
         </a:lnSpc>
         <a:spcBef>
-          <a:spcPts val="450"/>
+          <a:spcPts val="867"/>
         </a:spcBef>
         <a:buFont typeface="Arial" panose="020B0604020202020204" pitchFamily="34" charset="0"/>
         <a:buChar char="•"/>
-        <a:defRPr sz="1620" kern="1200">
+        <a:defRPr sz="3120" kern="1200">
           <a:solidFill>
             <a:schemeClr val="tx1"/>
           </a:solidFill>
@@ -2818,16 +2821,16 @@
           <a:cs typeface="+mn-cs"/>
         </a:defRPr>
       </a:lvl7pPr>
-      <a:lvl8pPr marL="3086100" indent="-205740" algn="l" defTabSz="822960" rtl="0" eaLnBrk="1" latinLnBrk="0" hangingPunct="1">
+      <a:lvl8pPr marL="5943486" indent="-396232" algn="l" defTabSz="1584930" rtl="0" eaLnBrk="1" latinLnBrk="0" hangingPunct="1">
         <a:lnSpc>
           <a:spcPct val="90000"/>
         </a:lnSpc>
         <a:spcBef>
-          <a:spcPts val="450"/>
+          <a:spcPts val="867"/>
         </a:spcBef>
         <a:buFont typeface="Arial" panose="020B0604020202020204" pitchFamily="34" charset="0"/>
         <a:buChar char="•"/>
-        <a:defRPr sz="1620" kern="1200">
+        <a:defRPr sz="3120" kern="1200">
           <a:solidFill>
             <a:schemeClr val="tx1"/>
           </a:solidFill>
@@ -2836,16 +2839,16 @@
           <a:cs typeface="+mn-cs"/>
         </a:defRPr>
       </a:lvl8pPr>
-      <a:lvl9pPr marL="3497580" indent="-205740" algn="l" defTabSz="822960" rtl="0" eaLnBrk="1" latinLnBrk="0" hangingPunct="1">
+      <a:lvl9pPr marL="6735950" indent="-396232" algn="l" defTabSz="1584930" rtl="0" eaLnBrk="1" latinLnBrk="0" hangingPunct="1">
         <a:lnSpc>
           <a:spcPct val="90000"/>
         </a:lnSpc>
         <a:spcBef>
-          <a:spcPts val="450"/>
+          <a:spcPts val="867"/>
         </a:spcBef>
         <a:buFont typeface="Arial" panose="020B0604020202020204" pitchFamily="34" charset="0"/>
         <a:buChar char="•"/>
-        <a:defRPr sz="1620" kern="1200">
+        <a:defRPr sz="3120" kern="1200">
           <a:solidFill>
             <a:schemeClr val="tx1"/>
           </a:solidFill>
@@ -2859,8 +2862,8 @@
       <a:defPPr>
         <a:defRPr lang="en-US"/>
       </a:defPPr>
-      <a:lvl1pPr marL="0" algn="l" defTabSz="822960" rtl="0" eaLnBrk="1" latinLnBrk="0" hangingPunct="1">
-        <a:defRPr sz="1620" kern="1200">
+      <a:lvl1pPr marL="0" algn="l" defTabSz="1584930" rtl="0" eaLnBrk="1" latinLnBrk="0" hangingPunct="1">
+        <a:defRPr sz="3120" kern="1200">
           <a:solidFill>
             <a:schemeClr val="tx1"/>
           </a:solidFill>
@@ -2869,8 +2872,8 @@
           <a:cs typeface="+mn-cs"/>
         </a:defRPr>
       </a:lvl1pPr>
-      <a:lvl2pPr marL="411480" algn="l" defTabSz="822960" rtl="0" eaLnBrk="1" latinLnBrk="0" hangingPunct="1">
-        <a:defRPr sz="1620" kern="1200">
+      <a:lvl2pPr marL="792465" algn="l" defTabSz="1584930" rtl="0" eaLnBrk="1" latinLnBrk="0" hangingPunct="1">
+        <a:defRPr sz="3120" kern="1200">
           <a:solidFill>
             <a:schemeClr val="tx1"/>
           </a:solidFill>
@@ -2879,8 +2882,8 @@
           <a:cs typeface="+mn-cs"/>
         </a:defRPr>
       </a:lvl2pPr>
-      <a:lvl3pPr marL="822960" algn="l" defTabSz="822960" rtl="0" eaLnBrk="1" latinLnBrk="0" hangingPunct="1">
-        <a:defRPr sz="1620" kern="1200">
+      <a:lvl3pPr marL="1584930" algn="l" defTabSz="1584930" rtl="0" eaLnBrk="1" latinLnBrk="0" hangingPunct="1">
+        <a:defRPr sz="3120" kern="1200">
           <a:solidFill>
             <a:schemeClr val="tx1"/>
           </a:solidFill>
@@ -2889,8 +2892,8 @@
           <a:cs typeface="+mn-cs"/>
         </a:defRPr>
       </a:lvl3pPr>
-      <a:lvl4pPr marL="1234440" algn="l" defTabSz="822960" rtl="0" eaLnBrk="1" latinLnBrk="0" hangingPunct="1">
-        <a:defRPr sz="1620" kern="1200">
+      <a:lvl4pPr marL="2377394" algn="l" defTabSz="1584930" rtl="0" eaLnBrk="1" latinLnBrk="0" hangingPunct="1">
+        <a:defRPr sz="3120" kern="1200">
           <a:solidFill>
             <a:schemeClr val="tx1"/>
           </a:solidFill>
@@ -2899,8 +2902,8 @@
           <a:cs typeface="+mn-cs"/>
         </a:defRPr>
       </a:lvl4pPr>
-      <a:lvl5pPr marL="1645920" algn="l" defTabSz="822960" rtl="0" eaLnBrk="1" latinLnBrk="0" hangingPunct="1">
-        <a:defRPr sz="1620" kern="1200">
+      <a:lvl5pPr marL="3169859" algn="l" defTabSz="1584930" rtl="0" eaLnBrk="1" latinLnBrk="0" hangingPunct="1">
+        <a:defRPr sz="3120" kern="1200">
           <a:solidFill>
             <a:schemeClr val="tx1"/>
           </a:solidFill>
@@ -2909,8 +2912,8 @@
           <a:cs typeface="+mn-cs"/>
         </a:defRPr>
       </a:lvl5pPr>
-      <a:lvl6pPr marL="2057400" algn="l" defTabSz="822960" rtl="0" eaLnBrk="1" latinLnBrk="0" hangingPunct="1">
-        <a:defRPr sz="1620" kern="1200">
+      <a:lvl6pPr marL="3962324" algn="l" defTabSz="1584930" rtl="0" eaLnBrk="1" latinLnBrk="0" hangingPunct="1">
+        <a:defRPr sz="3120" kern="1200">
           <a:solidFill>
             <a:schemeClr val="tx1"/>
           </a:solidFill>
@@ -2919,8 +2922,8 @@
           <a:cs typeface="+mn-cs"/>
         </a:defRPr>
       </a:lvl6pPr>
-      <a:lvl7pPr marL="2468880" algn="l" defTabSz="822960" rtl="0" eaLnBrk="1" latinLnBrk="0" hangingPunct="1">
-        <a:defRPr sz="1620" kern="1200">
+      <a:lvl7pPr marL="4754789" algn="l" defTabSz="1584930" rtl="0" eaLnBrk="1" latinLnBrk="0" hangingPunct="1">
+        <a:defRPr sz="3120" kern="1200">
           <a:solidFill>
             <a:schemeClr val="tx1"/>
           </a:solidFill>
@@ -2929,8 +2932,8 @@
           <a:cs typeface="+mn-cs"/>
         </a:defRPr>
       </a:lvl7pPr>
-      <a:lvl8pPr marL="2880360" algn="l" defTabSz="822960" rtl="0" eaLnBrk="1" latinLnBrk="0" hangingPunct="1">
-        <a:defRPr sz="1620" kern="1200">
+      <a:lvl8pPr marL="5547253" algn="l" defTabSz="1584930" rtl="0" eaLnBrk="1" latinLnBrk="0" hangingPunct="1">
+        <a:defRPr sz="3120" kern="1200">
           <a:solidFill>
             <a:schemeClr val="tx1"/>
           </a:solidFill>
@@ -2939,8 +2942,8 @@
           <a:cs typeface="+mn-cs"/>
         </a:defRPr>
       </a:lvl8pPr>
-      <a:lvl9pPr marL="3291840" algn="l" defTabSz="822960" rtl="0" eaLnBrk="1" latinLnBrk="0" hangingPunct="1">
-        <a:defRPr sz="1620" kern="1200">
+      <a:lvl9pPr marL="6339718" algn="l" defTabSz="1584930" rtl="0" eaLnBrk="1" latinLnBrk="0" hangingPunct="1">
+        <a:defRPr sz="3120" kern="1200">
           <a:solidFill>
             <a:schemeClr val="tx1"/>
           </a:solidFill>
@@ -2986,7 +2989,7 @@
           </p:nvPr>
         </p:nvGraphicFramePr>
         <p:xfrm>
-          <a:off x="1604631" y="10232408"/>
+          <a:off x="8056231" y="10232408"/>
           <a:ext cx="1187852" cy="1183892"/>
         </p:xfrm>
         <a:graphic>
@@ -3824,7 +3827,7 @@
           </p:nvPr>
         </p:nvGraphicFramePr>
         <p:xfrm>
-          <a:off x="4002051" y="10420735"/>
+          <a:off x="10453651" y="10420735"/>
           <a:ext cx="1909840" cy="780648"/>
         </p:xfrm>
         <a:graphic>
@@ -4655,10 +4658,10 @@
         </p:nvGrpSpPr>
         <p:grpSpPr>
           <a:xfrm>
-            <a:off x="2312983" y="830081"/>
-            <a:ext cx="692273" cy="987697"/>
+            <a:off x="8764584" y="830081"/>
+            <a:ext cx="1297695" cy="1480464"/>
             <a:chOff x="-68483" y="667203"/>
-            <a:chExt cx="742165" cy="1058880"/>
+            <a:chExt cx="575586" cy="902256"/>
           </a:xfrm>
         </p:grpSpPr>
         <p:sp>
@@ -4727,7 +4730,7 @@
           <p:spPr>
             <a:xfrm>
               <a:off x="183206" y="1363130"/>
-              <a:ext cx="311397" cy="362953"/>
+              <a:ext cx="128834" cy="206329"/>
             </a:xfrm>
             <a:prstGeom prst="rect">
               <a:avLst/>
@@ -4757,7 +4760,7 @@
           <p:spPr>
             <a:xfrm>
               <a:off x="-68483" y="1090365"/>
-              <a:ext cx="304523" cy="362953"/>
+              <a:ext cx="125990" cy="206329"/>
             </a:xfrm>
             <a:prstGeom prst="rect">
               <a:avLst/>
@@ -4787,7 +4790,7 @@
           <p:spPr>
             <a:xfrm>
               <a:off x="63878" y="667203"/>
-              <a:ext cx="609804" cy="362953"/>
+              <a:ext cx="252293" cy="206329"/>
             </a:xfrm>
             <a:prstGeom prst="rect">
               <a:avLst/>
@@ -4817,10 +4820,10 @@
         </p:nvGrpSpPr>
         <p:grpSpPr>
           <a:xfrm>
-            <a:off x="2253157" y="3062675"/>
-            <a:ext cx="794308" cy="1130013"/>
+            <a:off x="8704758" y="3062678"/>
+            <a:ext cx="1490523" cy="1638205"/>
             <a:chOff x="-1759381" y="2047577"/>
-            <a:chExt cx="851552" cy="1211452"/>
+            <a:chExt cx="703857" cy="1069530"/>
           </a:xfrm>
         </p:grpSpPr>
         <p:sp>
@@ -4885,7 +4888,7 @@
           <p:spPr>
             <a:xfrm>
               <a:off x="-1492584" y="2896076"/>
-              <a:ext cx="311397" cy="362953"/>
+              <a:ext cx="137163" cy="221031"/>
             </a:xfrm>
             <a:prstGeom prst="rect">
               <a:avLst/>
@@ -4915,7 +4918,7 @@
           <p:spPr>
             <a:xfrm>
               <a:off x="-1693514" y="2309630"/>
-              <a:ext cx="304523" cy="362953"/>
+              <a:ext cx="134135" cy="221031"/>
             </a:xfrm>
             <a:prstGeom prst="rect">
               <a:avLst/>
@@ -4945,7 +4948,7 @@
           <p:spPr>
             <a:xfrm>
               <a:off x="-1759381" y="2601723"/>
-              <a:ext cx="301086" cy="362953"/>
+              <a:ext cx="132622" cy="221031"/>
             </a:xfrm>
             <a:prstGeom prst="rect">
               <a:avLst/>
@@ -4975,7 +4978,7 @@
           <p:spPr>
             <a:xfrm>
               <a:off x="-1583142" y="2047577"/>
-              <a:ext cx="675313" cy="362953"/>
+              <a:ext cx="297460" cy="221031"/>
             </a:xfrm>
             <a:prstGeom prst="rect">
               <a:avLst/>
@@ -5005,7 +5008,7 @@
         </p:nvSpPr>
         <p:spPr>
           <a:xfrm>
-            <a:off x="1008627" y="9778087"/>
+            <a:off x="7460228" y="9778087"/>
             <a:ext cx="2447925" cy="338554"/>
           </a:xfrm>
           <a:prstGeom prst="rect">
@@ -5036,7 +5039,7 @@
         </p:nvSpPr>
         <p:spPr>
           <a:xfrm>
-            <a:off x="4134023" y="9778087"/>
+            <a:off x="10585626" y="9778087"/>
             <a:ext cx="1645899" cy="338554"/>
           </a:xfrm>
           <a:prstGeom prst="rect">
@@ -5067,7 +5070,7 @@
         </p:nvSpPr>
         <p:spPr>
           <a:xfrm>
-            <a:off x="3736811" y="220045"/>
+            <a:off x="10188412" y="220045"/>
             <a:ext cx="966803" cy="338554"/>
           </a:xfrm>
           <a:prstGeom prst="rect">
@@ -5098,7 +5101,7 @@
         </p:nvSpPr>
         <p:spPr>
           <a:xfrm>
-            <a:off x="169108" y="2578509"/>
+            <a:off x="6620709" y="2578509"/>
             <a:ext cx="966803" cy="338554"/>
           </a:xfrm>
           <a:prstGeom prst="rect">
@@ -5129,7 +5132,7 @@
         </p:nvSpPr>
         <p:spPr>
           <a:xfrm>
-            <a:off x="169108" y="176082"/>
+            <a:off x="6620709" y="176082"/>
             <a:ext cx="966803" cy="338554"/>
           </a:xfrm>
           <a:prstGeom prst="rect">
@@ -5160,10 +5163,10 @@
         </p:nvGrpSpPr>
         <p:grpSpPr>
           <a:xfrm>
-            <a:off x="449106" y="681778"/>
-            <a:ext cx="1726855" cy="1923569"/>
+            <a:off x="6900707" y="681779"/>
+            <a:ext cx="1726855" cy="2470889"/>
             <a:chOff x="648595" y="330053"/>
-            <a:chExt cx="1851308" cy="1844918"/>
+            <a:chExt cx="1851308" cy="1761573"/>
           </a:xfrm>
         </p:grpSpPr>
         <p:grpSp>
@@ -5817,7 +5820,7 @@
           <p:spPr>
             <a:xfrm>
               <a:off x="1594241" y="1850260"/>
-              <a:ext cx="311397" cy="324711"/>
+              <a:ext cx="311397" cy="241366"/>
             </a:xfrm>
             <a:prstGeom prst="rect">
               <a:avLst/>
@@ -5915,7 +5918,7 @@
           <p:spPr>
             <a:xfrm>
               <a:off x="648595" y="904030"/>
-              <a:ext cx="304523" cy="324711"/>
+              <a:ext cx="304523" cy="241366"/>
             </a:xfrm>
             <a:prstGeom prst="rect">
               <a:avLst/>
@@ -5959,7 +5962,7 @@
         </p:blipFill>
         <p:spPr>
           <a:xfrm>
-            <a:off x="485091" y="5563085"/>
+            <a:off x="6936693" y="5563087"/>
             <a:ext cx="5749855" cy="3273117"/>
           </a:xfrm>
           <a:prstGeom prst="rect">
@@ -5975,7 +5978,7 @@
         </p:nvSpPr>
         <p:spPr>
           <a:xfrm>
-            <a:off x="169108" y="5441768"/>
+            <a:off x="6620709" y="5441768"/>
             <a:ext cx="2898421" cy="338554"/>
           </a:xfrm>
           <a:prstGeom prst="rect">
@@ -6006,10 +6009,10 @@
         </p:nvGrpSpPr>
         <p:grpSpPr>
           <a:xfrm>
-            <a:off x="402123" y="3085436"/>
-            <a:ext cx="1738534" cy="2028595"/>
+            <a:off x="6853723" y="3085436"/>
+            <a:ext cx="1738534" cy="2578540"/>
             <a:chOff x="341113" y="2552612"/>
-            <a:chExt cx="1863829" cy="1957688"/>
+            <a:chExt cx="1863829" cy="1877474"/>
           </a:xfrm>
         </p:grpSpPr>
         <p:sp>
@@ -6021,7 +6024,7 @@
           <p:spPr>
             <a:xfrm>
               <a:off x="1171954" y="4183580"/>
-              <a:ext cx="311398" cy="326720"/>
+              <a:ext cx="311398" cy="246506"/>
             </a:xfrm>
             <a:prstGeom prst="rect">
               <a:avLst/>
@@ -6167,7 +6170,7 @@
             <p:spPr>
               <a:xfrm>
                 <a:off x="635156" y="2552612"/>
-                <a:ext cx="284052" cy="326720"/>
+                <a:ext cx="284052" cy="246506"/>
               </a:xfrm>
               <a:prstGeom prst="rect">
                 <a:avLst/>
@@ -6197,7 +6200,7 @@
             <p:spPr>
               <a:xfrm>
                 <a:off x="341113" y="3397433"/>
-                <a:ext cx="301086" cy="326720"/>
+                <a:ext cx="301086" cy="246506"/>
               </a:xfrm>
               <a:prstGeom prst="rect">
                 <a:avLst/>
@@ -6252,10 +6255,10 @@
         </p:nvGrpSpPr>
         <p:grpSpPr>
           <a:xfrm>
-            <a:off x="3346802" y="887569"/>
-            <a:ext cx="4459085" cy="3581491"/>
+            <a:off x="9798403" y="887569"/>
+            <a:ext cx="4459085" cy="5366474"/>
             <a:chOff x="3418043" y="629696"/>
-            <a:chExt cx="4564376" cy="3666060"/>
+            <a:chExt cx="4564376" cy="3543030"/>
           </a:xfrm>
         </p:grpSpPr>
         <p:pic>
@@ -6291,9 +6294,9 @@
           <p:grpSpPr>
             <a:xfrm>
               <a:off x="4546510" y="629696"/>
-              <a:ext cx="1863829" cy="1977516"/>
+              <a:ext cx="1863829" cy="1854487"/>
               <a:chOff x="341113" y="2552612"/>
-              <a:chExt cx="1863829" cy="1977516"/>
+              <a:chExt cx="1863829" cy="1854487"/>
             </a:xfrm>
           </p:grpSpPr>
           <p:sp>
@@ -6305,7 +6308,7 @@
             <p:spPr>
               <a:xfrm>
                 <a:off x="1171954" y="4183580"/>
-                <a:ext cx="297323" cy="346548"/>
+                <a:ext cx="297323" cy="223519"/>
               </a:xfrm>
               <a:prstGeom prst="rect">
                 <a:avLst/>
@@ -6451,7 +6454,7 @@
               <p:spPr>
                 <a:xfrm>
                   <a:off x="635156" y="2552612"/>
-                  <a:ext cx="284052" cy="346548"/>
+                  <a:ext cx="284052" cy="223519"/>
                 </a:xfrm>
                 <a:prstGeom prst="rect">
                   <a:avLst/>
@@ -6481,7 +6484,7 @@
               <p:spPr>
                 <a:xfrm>
                   <a:off x="341113" y="3397433"/>
-                  <a:ext cx="287478" cy="346548"/>
+                  <a:ext cx="287478" cy="223519"/>
                 </a:xfrm>
                 <a:prstGeom prst="rect">
                   <a:avLst/>
@@ -6537,9 +6540,9 @@
           <p:grpSpPr>
             <a:xfrm>
               <a:off x="3982182" y="1278212"/>
-              <a:ext cx="1863829" cy="1977516"/>
+              <a:ext cx="1863829" cy="1854487"/>
               <a:chOff x="341113" y="2552612"/>
-              <a:chExt cx="1863829" cy="1977516"/>
+              <a:chExt cx="1863829" cy="1854487"/>
             </a:xfrm>
           </p:grpSpPr>
           <p:sp>
@@ -6551,7 +6554,7 @@
             <p:spPr>
               <a:xfrm>
                 <a:off x="1171954" y="4183580"/>
-                <a:ext cx="297323" cy="346548"/>
+                <a:ext cx="297323" cy="223519"/>
               </a:xfrm>
               <a:prstGeom prst="rect">
                 <a:avLst/>
@@ -6697,7 +6700,7 @@
               <p:spPr>
                 <a:xfrm>
                   <a:off x="635156" y="2552612"/>
-                  <a:ext cx="284052" cy="346548"/>
+                  <a:ext cx="284052" cy="223519"/>
                 </a:xfrm>
                 <a:prstGeom prst="rect">
                   <a:avLst/>
@@ -6727,7 +6730,7 @@
               <p:spPr>
                 <a:xfrm>
                   <a:off x="341113" y="3397433"/>
-                  <a:ext cx="287478" cy="346548"/>
+                  <a:ext cx="287478" cy="223519"/>
                 </a:xfrm>
                 <a:prstGeom prst="rect">
                   <a:avLst/>
@@ -6783,9 +6786,9 @@
           <p:grpSpPr>
             <a:xfrm>
               <a:off x="3418043" y="1980443"/>
-              <a:ext cx="1863829" cy="1977516"/>
+              <a:ext cx="1863829" cy="1854487"/>
               <a:chOff x="341113" y="2552612"/>
-              <a:chExt cx="1863829" cy="1977516"/>
+              <a:chExt cx="1863829" cy="1854487"/>
             </a:xfrm>
           </p:grpSpPr>
           <p:sp>
@@ -6797,7 +6800,7 @@
             <p:spPr>
               <a:xfrm>
                 <a:off x="1171954" y="4183580"/>
-                <a:ext cx="297323" cy="346548"/>
+                <a:ext cx="297323" cy="223519"/>
               </a:xfrm>
               <a:prstGeom prst="rect">
                 <a:avLst/>
@@ -6943,7 +6946,7 @@
               <p:spPr>
                 <a:xfrm>
                   <a:off x="635156" y="2552612"/>
-                  <a:ext cx="284052" cy="346548"/>
+                  <a:ext cx="284052" cy="223519"/>
                 </a:xfrm>
                 <a:prstGeom prst="rect">
                   <a:avLst/>
@@ -6973,7 +6976,7 @@
               <p:spPr>
                 <a:xfrm>
                   <a:off x="341113" y="3397433"/>
-                  <a:ext cx="287478" cy="346548"/>
+                  <a:ext cx="287478" cy="223519"/>
                 </a:xfrm>
                 <a:prstGeom prst="rect">
                   <a:avLst/>
@@ -7076,8 +7079,8 @@
           </p:nvSpPr>
           <p:spPr>
             <a:xfrm>
-              <a:off x="4520579" y="3949208"/>
-              <a:ext cx="1238692" cy="346548"/>
+              <a:off x="4520579" y="3949207"/>
+              <a:ext cx="1238692" cy="223519"/>
             </a:xfrm>
             <a:prstGeom prst="rect">
               <a:avLst/>
@@ -7176,7 +7179,7 @@
           <p:spPr>
             <a:xfrm>
               <a:off x="7181410" y="2783075"/>
-              <a:ext cx="658285" cy="346548"/>
+              <a:ext cx="658285" cy="223519"/>
             </a:xfrm>
             <a:prstGeom prst="rect">
               <a:avLst/>
@@ -7206,8 +7209,8 @@
         </p:nvSpPr>
         <p:spPr>
           <a:xfrm>
-            <a:off x="169106" y="9088186"/>
-            <a:ext cx="4126964" cy="338554"/>
+            <a:off x="6620708" y="9088186"/>
+            <a:ext cx="4126963" cy="338554"/>
           </a:xfrm>
           <a:prstGeom prst="rect">
             <a:avLst/>
@@ -7239,13 +7242,343 @@
   <p:clrMapOvr>
     <a:masterClrMapping/>
   </p:clrMapOvr>
-  <p:timing>
-    <p:tnLst>
-      <p:par>
-        <p:cTn id="1" dur="indefinite" restart="never" nodeType="tmRoot"/>
-      </p:par>
-    </p:tnLst>
-  </p:timing>
+</p:sld>
+</file>
+
+<file path=ppt/slides/slide2.xml><?xml version="1.0" encoding="utf-8"?>
+<p:sld xmlns:a="http://schemas.openxmlformats.org/drawingml/2006/main" xmlns:r="http://schemas.openxmlformats.org/officeDocument/2006/relationships" xmlns:p="http://schemas.openxmlformats.org/presentationml/2006/main">
+  <p:cSld>
+    <p:spTree>
+      <p:nvGrpSpPr>
+        <p:cNvPr id="1" name=""/>
+        <p:cNvGrpSpPr/>
+        <p:nvPr/>
+      </p:nvGrpSpPr>
+      <p:grpSpPr>
+        <a:xfrm>
+          <a:off x="0" y="0"/>
+          <a:ext cx="0" cy="0"/>
+          <a:chOff x="0" y="0"/>
+          <a:chExt cx="0" cy="0"/>
+        </a:xfrm>
+      </p:grpSpPr>
+      <p:pic>
+        <p:nvPicPr>
+          <p:cNvPr id="7" name="Picture 6">
+            <a:extLst>
+              <a:ext uri="{FF2B5EF4-FFF2-40B4-BE49-F238E27FC236}">
+                <a16:creationId xmlns:a16="http://schemas.microsoft.com/office/drawing/2014/main" id="{06A1C86D-007C-0299-7A25-222BD0AB788B}"/>
+              </a:ext>
+            </a:extLst>
+          </p:cNvPr>
+          <p:cNvPicPr>
+            <a:picLocks noChangeAspect="1"/>
+          </p:cNvPicPr>
+          <p:nvPr/>
+        </p:nvPicPr>
+        <p:blipFill rotWithShape="1">
+          <a:blip r:embed="rId2">
+            <a:extLst>
+              <a:ext uri="{28A0092B-C50C-407E-A947-70E740481C1C}">
+                <a14:useLocalDpi xmlns:a14="http://schemas.microsoft.com/office/drawing/2010/main" val="0"/>
+              </a:ext>
+            </a:extLst>
+          </a:blip>
+          <a:srcRect t="7512"/>
+          <a:stretch/>
+        </p:blipFill>
+        <p:spPr>
+          <a:xfrm>
+            <a:off x="22928366" y="-604161"/>
+            <a:ext cx="6546596" cy="5301902"/>
+          </a:xfrm>
+          <a:prstGeom prst="rect">
+            <a:avLst/>
+          </a:prstGeom>
+        </p:spPr>
+      </p:pic>
+      <p:sp>
+        <p:nvSpPr>
+          <p:cNvPr id="8" name="TextBox 7">
+            <a:extLst>
+              <a:ext uri="{FF2B5EF4-FFF2-40B4-BE49-F238E27FC236}">
+                <a16:creationId xmlns:a16="http://schemas.microsoft.com/office/drawing/2014/main" id="{4170988F-1564-064B-B719-53CE7422DA25}"/>
+              </a:ext>
+            </a:extLst>
+          </p:cNvPr>
+          <p:cNvSpPr txBox="1"/>
+          <p:nvPr/>
+        </p:nvSpPr>
+        <p:spPr>
+          <a:xfrm>
+            <a:off x="22653971" y="-1912178"/>
+            <a:ext cx="4901184" cy="954107"/>
+          </a:xfrm>
+          <a:prstGeom prst="rect">
+            <a:avLst/>
+          </a:prstGeom>
+          <a:noFill/>
+        </p:spPr>
+        <p:txBody>
+          <a:bodyPr wrap="square" rtlCol="0">
+            <a:spAutoFit/>
+          </a:bodyPr>
+          <a:lstStyle/>
+          <a:p>
+            <a:pPr algn="ctr"/>
+            <a:r>
+              <a:rPr lang="en-NL" sz="2800" dirty="0"/>
+              <a:t>Rotating dimensions (reslicing)</a:t>
+            </a:r>
+          </a:p>
+          <a:p>
+            <a:pPr algn="ctr"/>
+            <a:r>
+              <a:rPr lang="en-NL" sz="2800" dirty="0"/>
+              <a:t>(N-D image to N-D image)</a:t>
+            </a:r>
+          </a:p>
+        </p:txBody>
+      </p:sp>
+      <p:pic>
+        <p:nvPicPr>
+          <p:cNvPr id="17" name="Picture 16">
+            <a:extLst>
+              <a:ext uri="{FF2B5EF4-FFF2-40B4-BE49-F238E27FC236}">
+                <a16:creationId xmlns:a16="http://schemas.microsoft.com/office/drawing/2014/main" id="{2E647FCA-6DAE-E07D-BC16-232DE2B4B261}"/>
+              </a:ext>
+            </a:extLst>
+          </p:cNvPr>
+          <p:cNvPicPr>
+            <a:picLocks noChangeAspect="1"/>
+          </p:cNvPicPr>
+          <p:nvPr/>
+        </p:nvPicPr>
+        <p:blipFill rotWithShape="1">
+          <a:blip r:embed="rId3">
+            <a:extLst>
+              <a:ext uri="{28A0092B-C50C-407E-A947-70E740481C1C}">
+                <a14:useLocalDpi xmlns:a14="http://schemas.microsoft.com/office/drawing/2010/main" val="0"/>
+              </a:ext>
+            </a:extLst>
+          </a:blip>
+          <a:srcRect l="7346"/>
+          <a:stretch/>
+        </p:blipFill>
+        <p:spPr>
+          <a:xfrm>
+            <a:off x="21802943" y="7189460"/>
+            <a:ext cx="3301620" cy="2727618"/>
+          </a:xfrm>
+          <a:prstGeom prst="rect">
+            <a:avLst/>
+          </a:prstGeom>
+        </p:spPr>
+      </p:pic>
+      <p:grpSp>
+        <p:nvGrpSpPr>
+          <p:cNvPr id="24" name="Group 23">
+            <a:extLst>
+              <a:ext uri="{FF2B5EF4-FFF2-40B4-BE49-F238E27FC236}">
+                <a16:creationId xmlns:a16="http://schemas.microsoft.com/office/drawing/2014/main" id="{E44B4078-C09E-1F34-B7D2-66C771B698F6}"/>
+              </a:ext>
+            </a:extLst>
+          </p:cNvPr>
+          <p:cNvGrpSpPr/>
+          <p:nvPr/>
+        </p:nvGrpSpPr>
+        <p:grpSpPr>
+          <a:xfrm>
+            <a:off x="1973078" y="2046790"/>
+            <a:ext cx="18345032" cy="6707133"/>
+            <a:chOff x="1273582" y="2959931"/>
+            <a:chExt cx="14005047" cy="5120390"/>
+          </a:xfrm>
+        </p:grpSpPr>
+        <p:pic>
+          <p:nvPicPr>
+            <p:cNvPr id="2" name="Picture 1">
+              <a:extLst>
+                <a:ext uri="{FF2B5EF4-FFF2-40B4-BE49-F238E27FC236}">
+                  <a16:creationId xmlns:a16="http://schemas.microsoft.com/office/drawing/2014/main" id="{4A9B0141-C100-BF22-6469-87A35CEC18E9}"/>
+                </a:ext>
+              </a:extLst>
+            </p:cNvPr>
+            <p:cNvPicPr>
+              <a:picLocks noChangeAspect="1"/>
+            </p:cNvPicPr>
+            <p:nvPr/>
+          </p:nvPicPr>
+          <p:blipFill>
+            <a:blip r:embed="rId4" cstate="print">
+              <a:extLst>
+                <a:ext uri="{28A0092B-C50C-407E-A947-70E740481C1C}">
+                  <a14:useLocalDpi xmlns:a14="http://schemas.microsoft.com/office/drawing/2010/main" val="0"/>
+                </a:ext>
+              </a:extLst>
+            </a:blip>
+            <a:stretch>
+              <a:fillRect/>
+            </a:stretch>
+          </p:blipFill>
+          <p:spPr>
+            <a:xfrm>
+              <a:off x="7366918" y="3576563"/>
+              <a:ext cx="7911711" cy="4503758"/>
+            </a:xfrm>
+            <a:prstGeom prst="rect">
+              <a:avLst/>
+            </a:prstGeom>
+          </p:spPr>
+        </p:pic>
+        <p:grpSp>
+          <p:nvGrpSpPr>
+            <p:cNvPr id="23" name="Group 22">
+              <a:extLst>
+                <a:ext uri="{FF2B5EF4-FFF2-40B4-BE49-F238E27FC236}">
+                  <a16:creationId xmlns:a16="http://schemas.microsoft.com/office/drawing/2014/main" id="{7E13547E-B28B-B2E0-96AB-27C66BF1FF5C}"/>
+                </a:ext>
+              </a:extLst>
+            </p:cNvPr>
+            <p:cNvGrpSpPr/>
+            <p:nvPr/>
+          </p:nvGrpSpPr>
+          <p:grpSpPr>
+            <a:xfrm>
+              <a:off x="1273582" y="2959931"/>
+              <a:ext cx="12012314" cy="4528510"/>
+              <a:chOff x="1273582" y="2959931"/>
+              <a:chExt cx="12012314" cy="4528510"/>
+            </a:xfrm>
+          </p:grpSpPr>
+          <p:sp>
+            <p:nvSpPr>
+              <p:cNvPr id="3" name="TextBox 2">
+                <a:extLst>
+                  <a:ext uri="{FF2B5EF4-FFF2-40B4-BE49-F238E27FC236}">
+                    <a16:creationId xmlns:a16="http://schemas.microsoft.com/office/drawing/2014/main" id="{443F01F4-D39C-894C-4D7B-84694AF2E338}"/>
+                  </a:ext>
+                </a:extLst>
+              </p:cNvPr>
+              <p:cNvSpPr txBox="1"/>
+              <p:nvPr/>
+            </p:nvSpPr>
+            <p:spPr>
+              <a:xfrm>
+                <a:off x="1939718" y="2959931"/>
+                <a:ext cx="4901184" cy="728389"/>
+              </a:xfrm>
+              <a:prstGeom prst="rect">
+                <a:avLst/>
+              </a:prstGeom>
+              <a:noFill/>
+            </p:spPr>
+            <p:txBody>
+              <a:bodyPr wrap="square" rtlCol="0">
+                <a:spAutoFit/>
+              </a:bodyPr>
+              <a:lstStyle/>
+              <a:p>
+                <a:pPr algn="ctr"/>
+                <a:r>
+                  <a:rPr lang="en-NL" sz="2800" dirty="0"/>
+                  <a:t>Subsetting</a:t>
+                </a:r>
+              </a:p>
+              <a:p>
+                <a:pPr algn="ctr"/>
+                <a:r>
+                  <a:rPr lang="en-NL" sz="2800" dirty="0"/>
+                  <a:t>(3D image to smaller 3D image)</a:t>
+                </a:r>
+              </a:p>
+            </p:txBody>
+          </p:sp>
+          <p:sp>
+            <p:nvSpPr>
+              <p:cNvPr id="10" name="TextBox 9">
+                <a:extLst>
+                  <a:ext uri="{FF2B5EF4-FFF2-40B4-BE49-F238E27FC236}">
+                    <a16:creationId xmlns:a16="http://schemas.microsoft.com/office/drawing/2014/main" id="{6C5CAEE1-A7CE-5C9C-B134-E04EE0F3B88B}"/>
+                  </a:ext>
+                </a:extLst>
+              </p:cNvPr>
+              <p:cNvSpPr txBox="1"/>
+              <p:nvPr/>
+            </p:nvSpPr>
+            <p:spPr>
+              <a:xfrm>
+                <a:off x="8384712" y="2959931"/>
+                <a:ext cx="4901184" cy="728389"/>
+              </a:xfrm>
+              <a:prstGeom prst="rect">
+                <a:avLst/>
+              </a:prstGeom>
+              <a:noFill/>
+            </p:spPr>
+            <p:txBody>
+              <a:bodyPr wrap="square" rtlCol="0">
+                <a:spAutoFit/>
+              </a:bodyPr>
+              <a:lstStyle/>
+              <a:p>
+                <a:pPr algn="ctr"/>
+                <a:r>
+                  <a:rPr lang="en-NL" sz="2800" dirty="0"/>
+                  <a:t>Slicing</a:t>
+                </a:r>
+              </a:p>
+              <a:p>
+                <a:pPr algn="ctr"/>
+                <a:r>
+                  <a:rPr lang="en-NL" sz="2800" dirty="0"/>
+                  <a:t>(3D image to 2D slice)</a:t>
+                </a:r>
+              </a:p>
+            </p:txBody>
+          </p:sp>
+          <p:pic>
+            <p:nvPicPr>
+              <p:cNvPr id="22" name="Picture 21">
+                <a:extLst>
+                  <a:ext uri="{FF2B5EF4-FFF2-40B4-BE49-F238E27FC236}">
+                    <a16:creationId xmlns:a16="http://schemas.microsoft.com/office/drawing/2014/main" id="{E1682A34-FEAA-98E6-8047-5E0D8E839A6E}"/>
+                  </a:ext>
+                </a:extLst>
+              </p:cNvPr>
+              <p:cNvPicPr>
+                <a:picLocks noChangeAspect="1"/>
+              </p:cNvPicPr>
+              <p:nvPr/>
+            </p:nvPicPr>
+            <p:blipFill>
+              <a:blip r:embed="rId5"/>
+              <a:stretch>
+                <a:fillRect/>
+              </a:stretch>
+            </p:blipFill>
+            <p:spPr>
+              <a:xfrm>
+                <a:off x="1273582" y="4381260"/>
+                <a:ext cx="5830328" cy="3107181"/>
+              </a:xfrm>
+              <a:prstGeom prst="rect">
+                <a:avLst/>
+              </a:prstGeom>
+            </p:spPr>
+          </p:pic>
+        </p:grpSp>
+      </p:grpSp>
+    </p:spTree>
+    <p:extLst>
+      <p:ext uri="{BB962C8B-B14F-4D97-AF65-F5344CB8AC3E}">
+        <p14:creationId xmlns:p14="http://schemas.microsoft.com/office/powerpoint/2010/main" val="2606832217"/>
+      </p:ext>
+    </p:extLst>
+  </p:cSld>
+  <p:clrMapOvr>
+    <a:masterClrMapping/>
+  </p:clrMapOvr>
 </p:sld>
 </file>
 
@@ -7266,7 +7599,7 @@
         <a:srgbClr val="E7E6E6"/>
       </a:lt2>
       <a:accent1>
-        <a:srgbClr val="5B9BD5"/>
+        <a:srgbClr val="4472C4"/>
       </a:accent1>
       <a:accent2>
         <a:srgbClr val="ED7D31"/>
@@ -7278,7 +7611,7 @@
         <a:srgbClr val="FFC000"/>
       </a:accent4>
       <a:accent5>
-        <a:srgbClr val="4472C4"/>
+        <a:srgbClr val="5B9BD5"/>
       </a:accent5>
       <a:accent6>
         <a:srgbClr val="70AD47"/>
@@ -7504,7 +7837,7 @@
   <a:extraClrSchemeLst/>
   <a:extLst>
     <a:ext uri="{05A4C25C-085E-4340-85A3-A5531E510DB2}">
-      <thm15:themeFamily xmlns:thm15="http://schemas.microsoft.com/office/thememl/2012/main" name="Office Theme" id="{62F939B6-93AF-4DB8-9C6B-D6C7DFDC589F}" vid="{4A3C46E8-61CC-4603-A589-7422A47A8E4A}"/>
+      <thm15:themeFamily xmlns:thm15="http://schemas.microsoft.com/office/thememl/2012/main" name="Office Theme 2013 - 2022" id="{62F939B6-93AF-4DB8-9C6B-D6C7DFDC589F}" vid="{4A3C46E8-61CC-4603-A589-7422A47A8E4A}"/>
     </a:ext>
   </a:extLst>
 </a:theme>

</xml_diff>

<commit_message>
Improve volume slicing figure
</commit_message>
<xml_diff>
--- a/figures/resources/volume_slicing.pptx
+++ b/figures/resources/volume_slicing.pptx
@@ -245,7 +245,7 @@
           <a:p>
             <a:fld id="{FF874483-BE91-4EEA-A4B1-1FBBEB5201ED}" type="datetimeFigureOut">
               <a:rPr lang="en-US" smtClean="0"/>
-              <a:t>1/30/24</a:t>
+              <a:t>2/21/24</a:t>
             </a:fld>
             <a:endParaRPr lang="en-US"/>
           </a:p>
@@ -415,7 +415,7 @@
           <a:p>
             <a:fld id="{FF874483-BE91-4EEA-A4B1-1FBBEB5201ED}" type="datetimeFigureOut">
               <a:rPr lang="en-US" smtClean="0"/>
-              <a:t>1/30/24</a:t>
+              <a:t>2/21/24</a:t>
             </a:fld>
             <a:endParaRPr lang="en-US"/>
           </a:p>
@@ -595,7 +595,7 @@
           <a:p>
             <a:fld id="{FF874483-BE91-4EEA-A4B1-1FBBEB5201ED}" type="datetimeFigureOut">
               <a:rPr lang="en-US" smtClean="0"/>
-              <a:t>1/30/24</a:t>
+              <a:t>2/21/24</a:t>
             </a:fld>
             <a:endParaRPr lang="en-US"/>
           </a:p>
@@ -765,7 +765,7 @@
           <a:p>
             <a:fld id="{FF874483-BE91-4EEA-A4B1-1FBBEB5201ED}" type="datetimeFigureOut">
               <a:rPr lang="en-US" smtClean="0"/>
-              <a:t>1/30/24</a:t>
+              <a:t>2/21/24</a:t>
             </a:fld>
             <a:endParaRPr lang="en-US"/>
           </a:p>
@@ -1011,7 +1011,7 @@
           <a:p>
             <a:fld id="{FF874483-BE91-4EEA-A4B1-1FBBEB5201ED}" type="datetimeFigureOut">
               <a:rPr lang="en-US" smtClean="0"/>
-              <a:t>1/30/24</a:t>
+              <a:t>2/21/24</a:t>
             </a:fld>
             <a:endParaRPr lang="en-US"/>
           </a:p>
@@ -1243,7 +1243,7 @@
           <a:p>
             <a:fld id="{FF874483-BE91-4EEA-A4B1-1FBBEB5201ED}" type="datetimeFigureOut">
               <a:rPr lang="en-US" smtClean="0"/>
-              <a:t>1/30/24</a:t>
+              <a:t>2/21/24</a:t>
             </a:fld>
             <a:endParaRPr lang="en-US"/>
           </a:p>
@@ -1610,7 +1610,7 @@
           <a:p>
             <a:fld id="{FF874483-BE91-4EEA-A4B1-1FBBEB5201ED}" type="datetimeFigureOut">
               <a:rPr lang="en-US" smtClean="0"/>
-              <a:t>1/30/24</a:t>
+              <a:t>2/21/24</a:t>
             </a:fld>
             <a:endParaRPr lang="en-US"/>
           </a:p>
@@ -1728,7 +1728,7 @@
           <a:p>
             <a:fld id="{FF874483-BE91-4EEA-A4B1-1FBBEB5201ED}" type="datetimeFigureOut">
               <a:rPr lang="en-US" smtClean="0"/>
-              <a:t>1/30/24</a:t>
+              <a:t>2/21/24</a:t>
             </a:fld>
             <a:endParaRPr lang="en-US"/>
           </a:p>
@@ -1823,7 +1823,7 @@
           <a:p>
             <a:fld id="{FF874483-BE91-4EEA-A4B1-1FBBEB5201ED}" type="datetimeFigureOut">
               <a:rPr lang="en-US" smtClean="0"/>
-              <a:t>1/30/24</a:t>
+              <a:t>2/21/24</a:t>
             </a:fld>
             <a:endParaRPr lang="en-US"/>
           </a:p>
@@ -2100,7 +2100,7 @@
           <a:p>
             <a:fld id="{FF874483-BE91-4EEA-A4B1-1FBBEB5201ED}" type="datetimeFigureOut">
               <a:rPr lang="en-US" smtClean="0"/>
-              <a:t>1/30/24</a:t>
+              <a:t>2/21/24</a:t>
             </a:fld>
             <a:endParaRPr lang="en-US"/>
           </a:p>
@@ -2357,7 +2357,7 @@
           <a:p>
             <a:fld id="{FF874483-BE91-4EEA-A4B1-1FBBEB5201ED}" type="datetimeFigureOut">
               <a:rPr lang="en-US" smtClean="0"/>
-              <a:t>1/30/24</a:t>
+              <a:t>2/21/24</a:t>
             </a:fld>
             <a:endParaRPr lang="en-US"/>
           </a:p>
@@ -2570,7 +2570,7 @@
           <a:p>
             <a:fld id="{FF874483-BE91-4EEA-A4B1-1FBBEB5201ED}" type="datetimeFigureOut">
               <a:rPr lang="en-US" smtClean="0"/>
-              <a:t>1/30/24</a:t>
+              <a:t>2/21/24</a:t>
             </a:fld>
             <a:endParaRPr lang="en-US"/>
           </a:p>
@@ -21855,6 +21855,560 @@
               <a:effectLst/>
               <a:latin typeface="+mn-lt"/>
             </a:endParaRPr>
+          </a:p>
+        </p:txBody>
+      </p:sp>
+      <p:graphicFrame>
+        <p:nvGraphicFramePr>
+          <p:cNvPr id="2" name="Table 1">
+            <a:extLst>
+              <a:ext uri="{FF2B5EF4-FFF2-40B4-BE49-F238E27FC236}">
+                <a16:creationId xmlns:a16="http://schemas.microsoft.com/office/drawing/2014/main" id="{4D9307B4-FD1D-8210-B5ED-AF1A1726E469}"/>
+              </a:ext>
+            </a:extLst>
+          </p:cNvPr>
+          <p:cNvGraphicFramePr>
+            <a:graphicFrameLocks noGrp="1"/>
+          </p:cNvGraphicFramePr>
+          <p:nvPr>
+            <p:extLst>
+              <p:ext uri="{D42A27DB-BD31-4B8C-83A1-F6EECF244321}">
+                <p14:modId xmlns:p14="http://schemas.microsoft.com/office/powerpoint/2010/main" val="419723644"/>
+              </p:ext>
+            </p:extLst>
+          </p:nvPr>
+        </p:nvGraphicFramePr>
+        <p:xfrm>
+          <a:off x="10562108" y="2676761"/>
+          <a:ext cx="2282772" cy="1820625"/>
+        </p:xfrm>
+        <a:graphic>
+          <a:graphicData uri="http://schemas.openxmlformats.org/drawingml/2006/table">
+            <a:tbl>
+              <a:tblPr firstRow="1" bandRow="1">
+                <a:tableStyleId>{5940675A-B579-460E-94D1-54222C63F5DA}</a:tableStyleId>
+              </a:tblPr>
+              <a:tblGrid>
+                <a:gridCol w="570693">
+                  <a:extLst>
+                    <a:ext uri="{9D8B030D-6E8A-4147-A177-3AD203B41FA5}">
+                      <a16:colId xmlns:a16="http://schemas.microsoft.com/office/drawing/2014/main" val="2707236461"/>
+                    </a:ext>
+                  </a:extLst>
+                </a:gridCol>
+                <a:gridCol w="570693">
+                  <a:extLst>
+                    <a:ext uri="{9D8B030D-6E8A-4147-A177-3AD203B41FA5}">
+                      <a16:colId xmlns:a16="http://schemas.microsoft.com/office/drawing/2014/main" val="4224527136"/>
+                    </a:ext>
+                  </a:extLst>
+                </a:gridCol>
+                <a:gridCol w="570693">
+                  <a:extLst>
+                    <a:ext uri="{9D8B030D-6E8A-4147-A177-3AD203B41FA5}">
+                      <a16:colId xmlns:a16="http://schemas.microsoft.com/office/drawing/2014/main" val="1670545389"/>
+                    </a:ext>
+                  </a:extLst>
+                </a:gridCol>
+                <a:gridCol w="570693">
+                  <a:extLst>
+                    <a:ext uri="{9D8B030D-6E8A-4147-A177-3AD203B41FA5}">
+                      <a16:colId xmlns:a16="http://schemas.microsoft.com/office/drawing/2014/main" val="2466139580"/>
+                    </a:ext>
+                  </a:extLst>
+                </a:gridCol>
+              </a:tblGrid>
+              <a:tr h="606875">
+                <a:tc>
+                  <a:txBody>
+                    <a:bodyPr/>
+                    <a:lstStyle/>
+                    <a:p>
+                      <a:endParaRPr lang="en-DE" sz="1800"/>
+                    </a:p>
+                  </a:txBody>
+                  <a:tcPr marL="53520" marR="53520" marT="26760" marB="26760"/>
+                </a:tc>
+                <a:tc>
+                  <a:txBody>
+                    <a:bodyPr/>
+                    <a:lstStyle/>
+                    <a:p>
+                      <a:endParaRPr lang="en-DE" sz="1800"/>
+                    </a:p>
+                  </a:txBody>
+                  <a:tcPr marL="53520" marR="53520" marT="26760" marB="26760"/>
+                </a:tc>
+                <a:tc>
+                  <a:txBody>
+                    <a:bodyPr/>
+                    <a:lstStyle/>
+                    <a:p>
+                      <a:endParaRPr lang="en-DE" sz="1800" dirty="0"/>
+                    </a:p>
+                  </a:txBody>
+                  <a:tcPr marL="53520" marR="53520" marT="26760" marB="26760"/>
+                </a:tc>
+                <a:tc>
+                  <a:txBody>
+                    <a:bodyPr/>
+                    <a:lstStyle/>
+                    <a:p>
+                      <a:endParaRPr lang="en-DE" sz="1800"/>
+                    </a:p>
+                  </a:txBody>
+                  <a:tcPr marL="53520" marR="53520" marT="26760" marB="26760"/>
+                </a:tc>
+                <a:extLst>
+                  <a:ext uri="{0D108BD9-81ED-4DB2-BD59-A6C34878D82A}">
+                    <a16:rowId xmlns:a16="http://schemas.microsoft.com/office/drawing/2014/main" val="225731133"/>
+                  </a:ext>
+                </a:extLst>
+              </a:tr>
+              <a:tr h="606875">
+                <a:tc>
+                  <a:txBody>
+                    <a:bodyPr/>
+                    <a:lstStyle/>
+                    <a:p>
+                      <a:endParaRPr lang="en-DE" sz="1800"/>
+                    </a:p>
+                  </a:txBody>
+                  <a:tcPr marL="53520" marR="53520" marT="26760" marB="26760"/>
+                </a:tc>
+                <a:tc>
+                  <a:txBody>
+                    <a:bodyPr/>
+                    <a:lstStyle/>
+                    <a:p>
+                      <a:endParaRPr lang="en-DE" sz="1800"/>
+                    </a:p>
+                  </a:txBody>
+                  <a:tcPr marL="53520" marR="53520" marT="26760" marB="26760"/>
+                </a:tc>
+                <a:tc>
+                  <a:txBody>
+                    <a:bodyPr/>
+                    <a:lstStyle/>
+                    <a:p>
+                      <a:endParaRPr lang="en-DE" sz="1800"/>
+                    </a:p>
+                  </a:txBody>
+                  <a:tcPr marL="53520" marR="53520" marT="26760" marB="26760"/>
+                </a:tc>
+                <a:tc>
+                  <a:txBody>
+                    <a:bodyPr/>
+                    <a:lstStyle/>
+                    <a:p>
+                      <a:endParaRPr lang="en-DE" sz="1800"/>
+                    </a:p>
+                  </a:txBody>
+                  <a:tcPr marL="53520" marR="53520" marT="26760" marB="26760"/>
+                </a:tc>
+                <a:extLst>
+                  <a:ext uri="{0D108BD9-81ED-4DB2-BD59-A6C34878D82A}">
+                    <a16:rowId xmlns:a16="http://schemas.microsoft.com/office/drawing/2014/main" val="2418594944"/>
+                  </a:ext>
+                </a:extLst>
+              </a:tr>
+              <a:tr h="606875">
+                <a:tc>
+                  <a:txBody>
+                    <a:bodyPr/>
+                    <a:lstStyle/>
+                    <a:p>
+                      <a:endParaRPr lang="en-DE" sz="1800"/>
+                    </a:p>
+                  </a:txBody>
+                  <a:tcPr marL="53520" marR="53520" marT="26760" marB="26760"/>
+                </a:tc>
+                <a:tc>
+                  <a:txBody>
+                    <a:bodyPr/>
+                    <a:lstStyle/>
+                    <a:p>
+                      <a:endParaRPr lang="en-DE" sz="1800"/>
+                    </a:p>
+                  </a:txBody>
+                  <a:tcPr marL="53520" marR="53520" marT="26760" marB="26760"/>
+                </a:tc>
+                <a:tc>
+                  <a:txBody>
+                    <a:bodyPr/>
+                    <a:lstStyle/>
+                    <a:p>
+                      <a:endParaRPr lang="en-DE" sz="1800"/>
+                    </a:p>
+                  </a:txBody>
+                  <a:tcPr marL="53520" marR="53520" marT="26760" marB="26760"/>
+                </a:tc>
+                <a:tc>
+                  <a:txBody>
+                    <a:bodyPr/>
+                    <a:lstStyle/>
+                    <a:p>
+                      <a:endParaRPr lang="en-DE" sz="1800" dirty="0"/>
+                    </a:p>
+                  </a:txBody>
+                  <a:tcPr marL="53520" marR="53520" marT="26760" marB="26760"/>
+                </a:tc>
+                <a:extLst>
+                  <a:ext uri="{0D108BD9-81ED-4DB2-BD59-A6C34878D82A}">
+                    <a16:rowId xmlns:a16="http://schemas.microsoft.com/office/drawing/2014/main" val="1992112967"/>
+                  </a:ext>
+                </a:extLst>
+              </a:tr>
+            </a:tbl>
+          </a:graphicData>
+        </a:graphic>
+      </p:graphicFrame>
+      <p:graphicFrame>
+        <p:nvGraphicFramePr>
+          <p:cNvPr id="3" name="Table 2">
+            <a:extLst>
+              <a:ext uri="{FF2B5EF4-FFF2-40B4-BE49-F238E27FC236}">
+                <a16:creationId xmlns:a16="http://schemas.microsoft.com/office/drawing/2014/main" id="{DCEBA75D-6A1E-5490-5EE9-E1935B102664}"/>
+              </a:ext>
+            </a:extLst>
+          </p:cNvPr>
+          <p:cNvGraphicFramePr>
+            <a:graphicFrameLocks noGrp="1"/>
+          </p:cNvGraphicFramePr>
+          <p:nvPr>
+            <p:extLst>
+              <p:ext uri="{D42A27DB-BD31-4B8C-83A1-F6EECF244321}">
+                <p14:modId xmlns:p14="http://schemas.microsoft.com/office/powerpoint/2010/main" val="1239313396"/>
+              </p:ext>
+            </p:extLst>
+          </p:nvPr>
+        </p:nvGraphicFramePr>
+        <p:xfrm>
+          <a:off x="13230088" y="2131741"/>
+          <a:ext cx="2282772" cy="3000480"/>
+        </p:xfrm>
+        <a:graphic>
+          <a:graphicData uri="http://schemas.openxmlformats.org/drawingml/2006/table">
+            <a:tbl>
+              <a:tblPr firstRow="1" bandRow="1">
+                <a:tableStyleId>{5940675A-B579-460E-94D1-54222C63F5DA}</a:tableStyleId>
+              </a:tblPr>
+              <a:tblGrid>
+                <a:gridCol w="570693">
+                  <a:extLst>
+                    <a:ext uri="{9D8B030D-6E8A-4147-A177-3AD203B41FA5}">
+                      <a16:colId xmlns:a16="http://schemas.microsoft.com/office/drawing/2014/main" val="2707236461"/>
+                    </a:ext>
+                  </a:extLst>
+                </a:gridCol>
+                <a:gridCol w="570693">
+                  <a:extLst>
+                    <a:ext uri="{9D8B030D-6E8A-4147-A177-3AD203B41FA5}">
+                      <a16:colId xmlns:a16="http://schemas.microsoft.com/office/drawing/2014/main" val="4224527136"/>
+                    </a:ext>
+                  </a:extLst>
+                </a:gridCol>
+                <a:gridCol w="570693">
+                  <a:extLst>
+                    <a:ext uri="{9D8B030D-6E8A-4147-A177-3AD203B41FA5}">
+                      <a16:colId xmlns:a16="http://schemas.microsoft.com/office/drawing/2014/main" val="1670545389"/>
+                    </a:ext>
+                  </a:extLst>
+                </a:gridCol>
+                <a:gridCol w="570693">
+                  <a:extLst>
+                    <a:ext uri="{9D8B030D-6E8A-4147-A177-3AD203B41FA5}">
+                      <a16:colId xmlns:a16="http://schemas.microsoft.com/office/drawing/2014/main" val="2466139580"/>
+                    </a:ext>
+                  </a:extLst>
+                </a:gridCol>
+              </a:tblGrid>
+              <a:tr h="1000160">
+                <a:tc>
+                  <a:txBody>
+                    <a:bodyPr/>
+                    <a:lstStyle/>
+                    <a:p>
+                      <a:endParaRPr lang="en-DE" sz="1800" dirty="0"/>
+                    </a:p>
+                  </a:txBody>
+                  <a:tcPr marL="53520" marR="53520" marT="26760" marB="26760"/>
+                </a:tc>
+                <a:tc>
+                  <a:txBody>
+                    <a:bodyPr/>
+                    <a:lstStyle/>
+                    <a:p>
+                      <a:endParaRPr lang="en-DE" sz="1800"/>
+                    </a:p>
+                  </a:txBody>
+                  <a:tcPr marL="53520" marR="53520" marT="26760" marB="26760"/>
+                </a:tc>
+                <a:tc>
+                  <a:txBody>
+                    <a:bodyPr/>
+                    <a:lstStyle/>
+                    <a:p>
+                      <a:endParaRPr lang="en-DE" sz="1800" dirty="0"/>
+                    </a:p>
+                  </a:txBody>
+                  <a:tcPr marL="53520" marR="53520" marT="26760" marB="26760"/>
+                </a:tc>
+                <a:tc>
+                  <a:txBody>
+                    <a:bodyPr/>
+                    <a:lstStyle/>
+                    <a:p>
+                      <a:endParaRPr lang="en-DE" sz="1800"/>
+                    </a:p>
+                  </a:txBody>
+                  <a:tcPr marL="53520" marR="53520" marT="26760" marB="26760"/>
+                </a:tc>
+                <a:extLst>
+                  <a:ext uri="{0D108BD9-81ED-4DB2-BD59-A6C34878D82A}">
+                    <a16:rowId xmlns:a16="http://schemas.microsoft.com/office/drawing/2014/main" val="225731133"/>
+                  </a:ext>
+                </a:extLst>
+              </a:tr>
+              <a:tr h="1000160">
+                <a:tc>
+                  <a:txBody>
+                    <a:bodyPr/>
+                    <a:lstStyle/>
+                    <a:p>
+                      <a:endParaRPr lang="en-DE" sz="1800"/>
+                    </a:p>
+                  </a:txBody>
+                  <a:tcPr marL="53520" marR="53520" marT="26760" marB="26760"/>
+                </a:tc>
+                <a:tc>
+                  <a:txBody>
+                    <a:bodyPr/>
+                    <a:lstStyle/>
+                    <a:p>
+                      <a:endParaRPr lang="en-DE" sz="1800"/>
+                    </a:p>
+                  </a:txBody>
+                  <a:tcPr marL="53520" marR="53520" marT="26760" marB="26760"/>
+                </a:tc>
+                <a:tc>
+                  <a:txBody>
+                    <a:bodyPr/>
+                    <a:lstStyle/>
+                    <a:p>
+                      <a:endParaRPr lang="en-DE" sz="1800"/>
+                    </a:p>
+                  </a:txBody>
+                  <a:tcPr marL="53520" marR="53520" marT="26760" marB="26760"/>
+                </a:tc>
+                <a:tc>
+                  <a:txBody>
+                    <a:bodyPr/>
+                    <a:lstStyle/>
+                    <a:p>
+                      <a:endParaRPr lang="en-DE" sz="1800"/>
+                    </a:p>
+                  </a:txBody>
+                  <a:tcPr marL="53520" marR="53520" marT="26760" marB="26760"/>
+                </a:tc>
+                <a:extLst>
+                  <a:ext uri="{0D108BD9-81ED-4DB2-BD59-A6C34878D82A}">
+                    <a16:rowId xmlns:a16="http://schemas.microsoft.com/office/drawing/2014/main" val="2418594944"/>
+                  </a:ext>
+                </a:extLst>
+              </a:tr>
+              <a:tr h="1000160">
+                <a:tc>
+                  <a:txBody>
+                    <a:bodyPr/>
+                    <a:lstStyle/>
+                    <a:p>
+                      <a:endParaRPr lang="en-DE" sz="1800"/>
+                    </a:p>
+                  </a:txBody>
+                  <a:tcPr marL="53520" marR="53520" marT="26760" marB="26760"/>
+                </a:tc>
+                <a:tc>
+                  <a:txBody>
+                    <a:bodyPr/>
+                    <a:lstStyle/>
+                    <a:p>
+                      <a:endParaRPr lang="en-DE" sz="1800"/>
+                    </a:p>
+                  </a:txBody>
+                  <a:tcPr marL="53520" marR="53520" marT="26760" marB="26760"/>
+                </a:tc>
+                <a:tc>
+                  <a:txBody>
+                    <a:bodyPr/>
+                    <a:lstStyle/>
+                    <a:p>
+                      <a:endParaRPr lang="en-DE" sz="1800"/>
+                    </a:p>
+                  </a:txBody>
+                  <a:tcPr marL="53520" marR="53520" marT="26760" marB="26760"/>
+                </a:tc>
+                <a:tc>
+                  <a:txBody>
+                    <a:bodyPr/>
+                    <a:lstStyle/>
+                    <a:p>
+                      <a:endParaRPr lang="en-DE" sz="1800" dirty="0"/>
+                    </a:p>
+                  </a:txBody>
+                  <a:tcPr marL="53520" marR="53520" marT="26760" marB="26760"/>
+                </a:tc>
+                <a:extLst>
+                  <a:ext uri="{0D108BD9-81ED-4DB2-BD59-A6C34878D82A}">
+                    <a16:rowId xmlns:a16="http://schemas.microsoft.com/office/drawing/2014/main" val="1992112967"/>
+                  </a:ext>
+                </a:extLst>
+              </a:tr>
+            </a:tbl>
+          </a:graphicData>
+        </a:graphic>
+      </p:graphicFrame>
+      <p:sp>
+        <p:nvSpPr>
+          <p:cNvPr id="22" name="TextBox 21">
+            <a:extLst>
+              <a:ext uri="{FF2B5EF4-FFF2-40B4-BE49-F238E27FC236}">
+                <a16:creationId xmlns:a16="http://schemas.microsoft.com/office/drawing/2014/main" id="{20C16EF9-E793-9E4B-ACF9-82EE6A051231}"/>
+              </a:ext>
+            </a:extLst>
+          </p:cNvPr>
+          <p:cNvSpPr txBox="1"/>
+          <p:nvPr/>
+        </p:nvSpPr>
+        <p:spPr>
+          <a:xfrm>
+            <a:off x="11039530" y="1526535"/>
+            <a:ext cx="1209305" cy="369332"/>
+          </a:xfrm>
+          <a:prstGeom prst="rect">
+            <a:avLst/>
+          </a:prstGeom>
+          <a:noFill/>
+        </p:spPr>
+        <p:txBody>
+          <a:bodyPr wrap="none" rtlCol="0">
+            <a:spAutoFit/>
+          </a:bodyPr>
+          <a:lstStyle/>
+          <a:p>
+            <a:r>
+              <a:rPr lang="en-GB" dirty="0"/>
+              <a:t>pixel space</a:t>
+            </a:r>
+            <a:endParaRPr lang="en-DE" dirty="0"/>
+          </a:p>
+        </p:txBody>
+      </p:sp>
+      <p:sp>
+        <p:nvSpPr>
+          <p:cNvPr id="23" name="TextBox 22">
+            <a:extLst>
+              <a:ext uri="{FF2B5EF4-FFF2-40B4-BE49-F238E27FC236}">
+                <a16:creationId xmlns:a16="http://schemas.microsoft.com/office/drawing/2014/main" id="{F2154D14-3B68-C2E5-BB00-BD757DA2B647}"/>
+              </a:ext>
+            </a:extLst>
+          </p:cNvPr>
+          <p:cNvSpPr txBox="1"/>
+          <p:nvPr/>
+        </p:nvSpPr>
+        <p:spPr>
+          <a:xfrm>
+            <a:off x="13654731" y="1526535"/>
+            <a:ext cx="1516441" cy="369332"/>
+          </a:xfrm>
+          <a:prstGeom prst="rect">
+            <a:avLst/>
+          </a:prstGeom>
+          <a:noFill/>
+        </p:spPr>
+        <p:txBody>
+          <a:bodyPr wrap="none" rtlCol="0">
+            <a:spAutoFit/>
+          </a:bodyPr>
+          <a:lstStyle/>
+          <a:p>
+            <a:r>
+              <a:rPr lang="en-GB" dirty="0"/>
+              <a:t>physical space</a:t>
+            </a:r>
+            <a:endParaRPr lang="en-DE" dirty="0"/>
+          </a:p>
+        </p:txBody>
+      </p:sp>
+      <p:sp>
+        <p:nvSpPr>
+          <p:cNvPr id="24" name="TextBox 23">
+            <a:extLst>
+              <a:ext uri="{FF2B5EF4-FFF2-40B4-BE49-F238E27FC236}">
+                <a16:creationId xmlns:a16="http://schemas.microsoft.com/office/drawing/2014/main" id="{55546840-A67F-B74C-8A90-1FEF6D55970C}"/>
+              </a:ext>
+            </a:extLst>
+          </p:cNvPr>
+          <p:cNvSpPr txBox="1"/>
+          <p:nvPr/>
+        </p:nvSpPr>
+        <p:spPr>
+          <a:xfrm>
+            <a:off x="12473716" y="673865"/>
+            <a:ext cx="1319015" cy="400110"/>
+          </a:xfrm>
+          <a:prstGeom prst="rect">
+            <a:avLst/>
+          </a:prstGeom>
+          <a:noFill/>
+        </p:spPr>
+        <p:txBody>
+          <a:bodyPr wrap="none" rtlCol="0">
+            <a:spAutoFit/>
+          </a:bodyPr>
+          <a:lstStyle/>
+          <a:p>
+            <a:r>
+              <a:rPr lang="en-GB" sz="2000" dirty="0"/>
+              <a:t>Anisotropy</a:t>
+            </a:r>
+            <a:endParaRPr lang="en-DE" sz="2000" dirty="0"/>
+          </a:p>
+        </p:txBody>
+      </p:sp>
+      <p:sp>
+        <p:nvSpPr>
+          <p:cNvPr id="25" name="TextBox 24">
+            <a:extLst>
+              <a:ext uri="{FF2B5EF4-FFF2-40B4-BE49-F238E27FC236}">
+                <a16:creationId xmlns:a16="http://schemas.microsoft.com/office/drawing/2014/main" id="{7BB16401-81D3-72B9-CF9C-7C023675298B}"/>
+              </a:ext>
+            </a:extLst>
+          </p:cNvPr>
+          <p:cNvSpPr txBox="1"/>
+          <p:nvPr/>
+        </p:nvSpPr>
+        <p:spPr>
+          <a:xfrm>
+            <a:off x="6216594" y="623957"/>
+            <a:ext cx="1682320" cy="400110"/>
+          </a:xfrm>
+          <a:prstGeom prst="rect">
+            <a:avLst/>
+          </a:prstGeom>
+          <a:noFill/>
+        </p:spPr>
+        <p:txBody>
+          <a:bodyPr wrap="none" rtlCol="0">
+            <a:spAutoFit/>
+          </a:bodyPr>
+          <a:lstStyle/>
+          <a:p>
+            <a:r>
+              <a:rPr lang="en-GB" sz="2000" dirty="0"/>
+              <a:t>Volume slicing</a:t>
+            </a:r>
+            <a:endParaRPr lang="en-DE" sz="2000" dirty="0"/>
           </a:p>
         </p:txBody>
       </p:sp>

</xml_diff>